<commit_message>
3 week funkcne polohovanie
</commit_message>
<xml_diff>
--- a/RMR úloha 1.pptx
+++ b/RMR úloha 1.pptx
@@ -143,6 +143,11 @@
       </a:defRPr>
     </a:lvl9pPr>
   </p:defaultTextStyle>
+  <p:extLst>
+    <p:ext uri="{EFAFB233-063F-42B5-8137-9DF3F51BA10A}">
+      <p15:sldGuideLst xmlns:p15="http://schemas.microsoft.com/office/powerpoint/2012/main"/>
+    </p:ext>
+  </p:extLst>
 </p:presentation>
 </file>
 
@@ -868,7 +873,7 @@
           <a:p>
             <a:fld id="{85284AE7-8CB9-45AA-9827-7FB529BB5B3E}" type="datetimeFigureOut">
               <a:rPr lang="sk-SK" smtClean="0"/>
-              <a:t>7. 2. 2019</a:t>
+              <a:t>19. 2. 2019</a:t>
             </a:fld>
             <a:endParaRPr lang="sk-SK"/>
           </a:p>
@@ -1119,7 +1124,7 @@
           <a:p>
             <a:fld id="{85284AE7-8CB9-45AA-9827-7FB529BB5B3E}" type="datetimeFigureOut">
               <a:rPr lang="sk-SK" smtClean="0"/>
-              <a:t>7. 2. 2019</a:t>
+              <a:t>19. 2. 2019</a:t>
             </a:fld>
             <a:endParaRPr lang="sk-SK"/>
           </a:p>
@@ -1433,7 +1438,7 @@
           <a:p>
             <a:fld id="{85284AE7-8CB9-45AA-9827-7FB529BB5B3E}" type="datetimeFigureOut">
               <a:rPr lang="sk-SK" smtClean="0"/>
-              <a:t>7. 2. 2019</a:t>
+              <a:t>19. 2. 2019</a:t>
             </a:fld>
             <a:endParaRPr lang="sk-SK"/>
           </a:p>
@@ -1774,7 +1779,7 @@
           <a:p>
             <a:fld id="{85284AE7-8CB9-45AA-9827-7FB529BB5B3E}" type="datetimeFigureOut">
               <a:rPr lang="sk-SK" smtClean="0"/>
-              <a:t>7. 2. 2019</a:t>
+              <a:t>19. 2. 2019</a:t>
             </a:fld>
             <a:endParaRPr lang="sk-SK"/>
           </a:p>
@@ -2088,7 +2093,7 @@
           <a:p>
             <a:fld id="{85284AE7-8CB9-45AA-9827-7FB529BB5B3E}" type="datetimeFigureOut">
               <a:rPr lang="sk-SK" smtClean="0"/>
-              <a:t>7. 2. 2019</a:t>
+              <a:t>19. 2. 2019</a:t>
             </a:fld>
             <a:endParaRPr lang="sk-SK"/>
           </a:p>
@@ -2481,7 +2486,7 @@
           <a:p>
             <a:fld id="{85284AE7-8CB9-45AA-9827-7FB529BB5B3E}" type="datetimeFigureOut">
               <a:rPr lang="sk-SK" smtClean="0"/>
-              <a:t>7. 2. 2019</a:t>
+              <a:t>19. 2. 2019</a:t>
             </a:fld>
             <a:endParaRPr lang="sk-SK"/>
           </a:p>
@@ -2651,7 +2656,7 @@
           <a:p>
             <a:fld id="{85284AE7-8CB9-45AA-9827-7FB529BB5B3E}" type="datetimeFigureOut">
               <a:rPr lang="sk-SK" smtClean="0"/>
-              <a:t>7. 2. 2019</a:t>
+              <a:t>19. 2. 2019</a:t>
             </a:fld>
             <a:endParaRPr lang="sk-SK"/>
           </a:p>
@@ -2831,7 +2836,7 @@
           <a:p>
             <a:fld id="{85284AE7-8CB9-45AA-9827-7FB529BB5B3E}" type="datetimeFigureOut">
               <a:rPr lang="sk-SK" smtClean="0"/>
-              <a:t>7. 2. 2019</a:t>
+              <a:t>19. 2. 2019</a:t>
             </a:fld>
             <a:endParaRPr lang="sk-SK"/>
           </a:p>
@@ -3007,7 +3012,7 @@
           <a:p>
             <a:fld id="{85284AE7-8CB9-45AA-9827-7FB529BB5B3E}" type="datetimeFigureOut">
               <a:rPr lang="sk-SK" smtClean="0"/>
-              <a:t>7. 2. 2019</a:t>
+              <a:t>19. 2. 2019</a:t>
             </a:fld>
             <a:endParaRPr lang="sk-SK"/>
           </a:p>
@@ -3254,7 +3259,7 @@
           <a:p>
             <a:fld id="{85284AE7-8CB9-45AA-9827-7FB529BB5B3E}" type="datetimeFigureOut">
               <a:rPr lang="sk-SK" smtClean="0"/>
-              <a:t>7. 2. 2019</a:t>
+              <a:t>19. 2. 2019</a:t>
             </a:fld>
             <a:endParaRPr lang="sk-SK"/>
           </a:p>
@@ -3486,7 +3491,7 @@
           <a:p>
             <a:fld id="{85284AE7-8CB9-45AA-9827-7FB529BB5B3E}" type="datetimeFigureOut">
               <a:rPr lang="sk-SK" smtClean="0"/>
-              <a:t>7. 2. 2019</a:t>
+              <a:t>19. 2. 2019</a:t>
             </a:fld>
             <a:endParaRPr lang="sk-SK"/>
           </a:p>
@@ -3860,7 +3865,7 @@
           <a:p>
             <a:fld id="{85284AE7-8CB9-45AA-9827-7FB529BB5B3E}" type="datetimeFigureOut">
               <a:rPr lang="sk-SK" smtClean="0"/>
-              <a:t>7. 2. 2019</a:t>
+              <a:t>19. 2. 2019</a:t>
             </a:fld>
             <a:endParaRPr lang="sk-SK"/>
           </a:p>
@@ -3983,7 +3988,7 @@
           <a:p>
             <a:fld id="{85284AE7-8CB9-45AA-9827-7FB529BB5B3E}" type="datetimeFigureOut">
               <a:rPr lang="sk-SK" smtClean="0"/>
-              <a:t>7. 2. 2019</a:t>
+              <a:t>19. 2. 2019</a:t>
             </a:fld>
             <a:endParaRPr lang="sk-SK"/>
           </a:p>
@@ -4078,7 +4083,7 @@
           <a:p>
             <a:fld id="{85284AE7-8CB9-45AA-9827-7FB529BB5B3E}" type="datetimeFigureOut">
               <a:rPr lang="sk-SK" smtClean="0"/>
-              <a:t>7. 2. 2019</a:t>
+              <a:t>19. 2. 2019</a:t>
             </a:fld>
             <a:endParaRPr lang="sk-SK"/>
           </a:p>
@@ -4333,7 +4338,7 @@
           <a:p>
             <a:fld id="{85284AE7-8CB9-45AA-9827-7FB529BB5B3E}" type="datetimeFigureOut">
               <a:rPr lang="sk-SK" smtClean="0"/>
-              <a:t>7. 2. 2019</a:t>
+              <a:t>19. 2. 2019</a:t>
             </a:fld>
             <a:endParaRPr lang="sk-SK"/>
           </a:p>
@@ -4596,7 +4601,7 @@
           <a:p>
             <a:fld id="{85284AE7-8CB9-45AA-9827-7FB529BB5B3E}" type="datetimeFigureOut">
               <a:rPr lang="sk-SK" smtClean="0"/>
-              <a:t>7. 2. 2019</a:t>
+              <a:t>19. 2. 2019</a:t>
             </a:fld>
             <a:endParaRPr lang="sk-SK"/>
           </a:p>
@@ -5339,7 +5344,7 @@
           <a:p>
             <a:fld id="{85284AE7-8CB9-45AA-9827-7FB529BB5B3E}" type="datetimeFigureOut">
               <a:rPr lang="sk-SK" smtClean="0"/>
-              <a:t>7. 2. 2019</a:t>
+              <a:t>19. 2. 2019</a:t>
             </a:fld>
             <a:endParaRPr lang="sk-SK"/>
           </a:p>
@@ -6105,8 +6110,8 @@
           </a:p>
         </p:txBody>
       </p:sp>
-      <mc:AlternateContent xmlns:mc="http://schemas.openxmlformats.org/markup-compatibility/2006">
-        <mc:Choice xmlns:a14="http://schemas.microsoft.com/office/drawing/2010/main" Requires="a14">
+      <mc:AlternateContent xmlns:mc="http://schemas.openxmlformats.org/markup-compatibility/2006" xmlns:a14="http://schemas.microsoft.com/office/drawing/2010/main">
+        <mc:Choice Requires="a14">
           <p:sp>
             <p:nvSpPr>
               <p:cNvPr id="10" name="Rectangle 9">
@@ -6134,6 +6139,7 @@
               </a:bodyPr>
               <a:lstStyle/>
               <a:p>
+                <a:pPr/>
                 <a14:m>
                   <m:oMathPara xmlns:m="http://schemas.openxmlformats.org/officeDocument/2006/math">
                     <m:oMathParaPr>
@@ -6285,7 +6291,7 @@
             </p:txBody>
           </p:sp>
         </mc:Choice>
-        <mc:Fallback>
+        <mc:Fallback xmlns="">
           <p:sp>
             <p:nvSpPr>
               <p:cNvPr id="10" name="Rectangle 9">
@@ -6330,8 +6336,8 @@
           </p:sp>
         </mc:Fallback>
       </mc:AlternateContent>
-      <mc:AlternateContent xmlns:mc="http://schemas.openxmlformats.org/markup-compatibility/2006">
-        <mc:Choice xmlns:a14="http://schemas.microsoft.com/office/drawing/2010/main" Requires="a14">
+      <mc:AlternateContent xmlns:mc="http://schemas.openxmlformats.org/markup-compatibility/2006" xmlns:a14="http://schemas.microsoft.com/office/drawing/2010/main">
+        <mc:Choice Requires="a14">
           <p:sp>
             <p:nvSpPr>
               <p:cNvPr id="11" name="Rectangle 10">
@@ -6359,6 +6365,7 @@
               </a:bodyPr>
               <a:lstStyle/>
               <a:p>
+                <a:pPr/>
                 <a14:m>
                   <m:oMathPara xmlns:m="http://schemas.openxmlformats.org/officeDocument/2006/math">
                     <m:oMathParaPr>
@@ -6382,7 +6389,7 @@
             </p:txBody>
           </p:sp>
         </mc:Choice>
-        <mc:Fallback>
+        <mc:Fallback xmlns="">
           <p:sp>
             <p:nvSpPr>
               <p:cNvPr id="11" name="Rectangle 10">
@@ -6427,8 +6434,8 @@
           </p:sp>
         </mc:Fallback>
       </mc:AlternateContent>
-      <mc:AlternateContent xmlns:mc="http://schemas.openxmlformats.org/markup-compatibility/2006">
-        <mc:Choice xmlns:a14="http://schemas.microsoft.com/office/drawing/2010/main" Requires="a14">
+      <mc:AlternateContent xmlns:mc="http://schemas.openxmlformats.org/markup-compatibility/2006" xmlns:a14="http://schemas.microsoft.com/office/drawing/2010/main">
+        <mc:Choice Requires="a14">
           <p:sp>
             <p:nvSpPr>
               <p:cNvPr id="12" name="Rectangle 11">
@@ -6456,6 +6463,7 @@
               </a:bodyPr>
               <a:lstStyle/>
               <a:p>
+                <a:pPr/>
                 <a14:m>
                   <m:oMathPara xmlns:m="http://schemas.openxmlformats.org/officeDocument/2006/math">
                     <m:oMathParaPr>
@@ -6479,7 +6487,7 @@
             </p:txBody>
           </p:sp>
         </mc:Choice>
-        <mc:Fallback>
+        <mc:Fallback xmlns="">
           <p:sp>
             <p:nvSpPr>
               <p:cNvPr id="12" name="Rectangle 11">
@@ -6614,8 +6622,8 @@
           </a:fontRef>
         </p:style>
       </p:cxnSp>
-      <mc:AlternateContent xmlns:mc="http://schemas.openxmlformats.org/markup-compatibility/2006">
-        <mc:Choice xmlns:a14="http://schemas.microsoft.com/office/drawing/2010/main" Requires="a14">
+      <mc:AlternateContent xmlns:mc="http://schemas.openxmlformats.org/markup-compatibility/2006" xmlns:a14="http://schemas.microsoft.com/office/drawing/2010/main">
+        <mc:Choice Requires="a14">
           <p:sp>
             <p:nvSpPr>
               <p:cNvPr id="17" name="Rectangle 16">
@@ -6643,6 +6651,7 @@
               </a:bodyPr>
               <a:lstStyle/>
               <a:p>
+                <a:pPr/>
                 <a14:m>
                   <m:oMathPara xmlns:m="http://schemas.openxmlformats.org/officeDocument/2006/math">
                     <m:oMathParaPr>
@@ -6667,7 +6676,7 @@
             </p:txBody>
           </p:sp>
         </mc:Choice>
-        <mc:Fallback>
+        <mc:Fallback xmlns="">
           <p:sp>
             <p:nvSpPr>
               <p:cNvPr id="17" name="Rectangle 16">
@@ -7007,8 +7016,8 @@
           </a:p>
         </p:txBody>
       </p:sp>
-      <mc:AlternateContent xmlns:mc="http://schemas.openxmlformats.org/markup-compatibility/2006">
-        <mc:Choice xmlns:a14="http://schemas.microsoft.com/office/drawing/2010/main" Requires="a14">
+      <mc:AlternateContent xmlns:mc="http://schemas.openxmlformats.org/markup-compatibility/2006" xmlns:a14="http://schemas.microsoft.com/office/drawing/2010/main">
+        <mc:Choice Requires="a14">
           <p:sp>
             <p:nvSpPr>
               <p:cNvPr id="23" name="Rectangle 22">
@@ -7036,6 +7045,7 @@
               </a:bodyPr>
               <a:lstStyle/>
               <a:p>
+                <a:pPr/>
                 <a14:m>
                   <m:oMathPara xmlns:m="http://schemas.openxmlformats.org/officeDocument/2006/math">
                     <m:oMathParaPr>
@@ -7244,6 +7254,7 @@
                 </a:endParaRPr>
               </a:p>
               <a:p>
+                <a:pPr/>
                 <a14:m>
                   <m:oMathPara xmlns:m="http://schemas.openxmlformats.org/officeDocument/2006/math">
                     <m:oMathParaPr>
@@ -7449,6 +7460,7 @@
                 </a:endParaRPr>
               </a:p>
               <a:p>
+                <a:pPr/>
                 <a14:m>
                   <m:oMathPara xmlns:m="http://schemas.openxmlformats.org/officeDocument/2006/math">
                     <m:oMathParaPr>
@@ -7587,7 +7599,7 @@
             </p:txBody>
           </p:sp>
         </mc:Choice>
-        <mc:Fallback>
+        <mc:Fallback xmlns="">
           <p:sp>
             <p:nvSpPr>
               <p:cNvPr id="23" name="Rectangle 22">
@@ -7632,8 +7644,8 @@
           </p:sp>
         </mc:Fallback>
       </mc:AlternateContent>
-      <mc:AlternateContent xmlns:mc="http://schemas.openxmlformats.org/markup-compatibility/2006">
-        <mc:Choice xmlns:a14="http://schemas.microsoft.com/office/drawing/2010/main" Requires="a14">
+      <mc:AlternateContent xmlns:mc="http://schemas.openxmlformats.org/markup-compatibility/2006" xmlns:a14="http://schemas.microsoft.com/office/drawing/2010/main">
+        <mc:Choice Requires="a14">
           <p:sp>
             <p:nvSpPr>
               <p:cNvPr id="26" name="Rectangle 25">
@@ -7661,6 +7673,7 @@
               </a:bodyPr>
               <a:lstStyle/>
               <a:p>
+                <a:pPr/>
                 <a14:m>
                   <m:oMathPara xmlns:m="http://schemas.openxmlformats.org/officeDocument/2006/math">
                     <m:oMathParaPr>
@@ -7878,6 +7891,7 @@
                 </a:endParaRPr>
               </a:p>
               <a:p>
+                <a:pPr/>
                 <a14:m>
                   <m:oMathPara xmlns:m="http://schemas.openxmlformats.org/officeDocument/2006/math">
                     <m:oMathParaPr>
@@ -8092,6 +8106,7 @@
                 </a:endParaRPr>
               </a:p>
               <a:p>
+                <a:pPr/>
                 <a14:m>
                   <m:oMathPara xmlns:m="http://schemas.openxmlformats.org/officeDocument/2006/math">
                     <m:oMathParaPr>
@@ -8230,7 +8245,7 @@
             </p:txBody>
           </p:sp>
         </mc:Choice>
-        <mc:Fallback>
+        <mc:Fallback xmlns="">
           <p:sp>
             <p:nvSpPr>
               <p:cNvPr id="26" name="Rectangle 25">
@@ -8310,8 +8325,8 @@
           </a:p>
         </p:txBody>
       </p:sp>
-      <mc:AlternateContent xmlns:mc="http://schemas.openxmlformats.org/markup-compatibility/2006">
-        <mc:Choice xmlns:a14="http://schemas.microsoft.com/office/drawing/2010/main" Requires="a14">
+      <mc:AlternateContent xmlns:mc="http://schemas.openxmlformats.org/markup-compatibility/2006" xmlns:a14="http://schemas.microsoft.com/office/drawing/2010/main">
+        <mc:Choice Requires="a14">
           <p:sp>
             <p:nvSpPr>
               <p:cNvPr id="13" name="Rectangle 12">
@@ -8339,6 +8354,7 @@
               </a:bodyPr>
               <a:lstStyle/>
               <a:p>
+                <a:pPr/>
                 <a14:m>
                   <m:oMathPara xmlns:m="http://schemas.openxmlformats.org/officeDocument/2006/math">
                     <m:oMathParaPr>
@@ -8497,7 +8513,7 @@
             </p:txBody>
           </p:sp>
         </mc:Choice>
-        <mc:Fallback>
+        <mc:Fallback xmlns="">
           <p:sp>
             <p:nvSpPr>
               <p:cNvPr id="13" name="Rectangle 12">
@@ -8726,8 +8742,8 @@
           </a:p>
         </p:txBody>
       </p:sp>
-      <mc:AlternateContent xmlns:mc="http://schemas.openxmlformats.org/markup-compatibility/2006">
-        <mc:Choice xmlns:a14="http://schemas.microsoft.com/office/drawing/2010/main" Requires="a14">
+      <mc:AlternateContent xmlns:mc="http://schemas.openxmlformats.org/markup-compatibility/2006" xmlns:a14="http://schemas.microsoft.com/office/drawing/2010/main">
+        <mc:Choice Requires="a14">
           <p:sp>
             <p:nvSpPr>
               <p:cNvPr id="11" name="Rectangle 10">
@@ -8755,6 +8771,7 @@
               </a:bodyPr>
               <a:lstStyle/>
               <a:p>
+                <a:pPr/>
                 <a14:m>
                   <m:oMathPara xmlns:m="http://schemas.openxmlformats.org/officeDocument/2006/math">
                     <m:oMathParaPr>
@@ -8778,7 +8795,7 @@
             </p:txBody>
           </p:sp>
         </mc:Choice>
-        <mc:Fallback>
+        <mc:Fallback xmlns="">
           <p:sp>
             <p:nvSpPr>
               <p:cNvPr id="11" name="Rectangle 10">
@@ -8823,8 +8840,8 @@
           </p:sp>
         </mc:Fallback>
       </mc:AlternateContent>
-      <mc:AlternateContent xmlns:mc="http://schemas.openxmlformats.org/markup-compatibility/2006">
-        <mc:Choice xmlns:a14="http://schemas.microsoft.com/office/drawing/2010/main" Requires="a14">
+      <mc:AlternateContent xmlns:mc="http://schemas.openxmlformats.org/markup-compatibility/2006" xmlns:a14="http://schemas.microsoft.com/office/drawing/2010/main">
+        <mc:Choice Requires="a14">
           <p:sp>
             <p:nvSpPr>
               <p:cNvPr id="12" name="Rectangle 11">
@@ -8852,6 +8869,7 @@
               </a:bodyPr>
               <a:lstStyle/>
               <a:p>
+                <a:pPr/>
                 <a14:m>
                   <m:oMathPara xmlns:m="http://schemas.openxmlformats.org/officeDocument/2006/math">
                     <m:oMathParaPr>
@@ -8875,7 +8893,7 @@
             </p:txBody>
           </p:sp>
         </mc:Choice>
-        <mc:Fallback>
+        <mc:Fallback xmlns="">
           <p:sp>
             <p:nvSpPr>
               <p:cNvPr id="12" name="Rectangle 11">
@@ -9471,7 +9489,7 @@
             <p:spPr>
               <a:xfrm>
                 <a:off x="2129566" y="3866843"/>
-                <a:ext cx="7223388" cy="2310120"/>
+                <a:ext cx="7026347" cy="2310120"/>
               </a:xfrm>
               <a:prstGeom prst="rect">
                 <a:avLst/>
@@ -9483,6 +9501,7 @@
               </a:bodyPr>
               <a:lstStyle/>
               <a:p>
+                <a:pPr/>
                 <a14:m>
                   <m:oMathPara xmlns:m="http://schemas.openxmlformats.org/officeDocument/2006/math">
                     <m:oMathParaPr>
@@ -9875,17 +9894,17 @@
                                     </a:rPr>
                                     <m:t>𝑘</m:t>
                                   </m:r>
+                                  <m:r>
+                                    <a:rPr lang="sk-SK" sz="2800" b="0" i="1" smtClean="0">
+                                      <a:solidFill>
+                                        <a:prstClr val="black"/>
+                                      </a:solidFill>
+                                      <a:latin typeface="Cambria Math" panose="02040503050406030204" pitchFamily="18" charset="0"/>
+                                    </a:rPr>
+                                    <m:t>+1</m:t>
+                                  </m:r>
                                 </m:sub>
                               </m:sSub>
-                              <m:r>
-                                <a:rPr lang="sk-SK" sz="2800" i="1">
-                                  <a:solidFill>
-                                    <a:prstClr val="black"/>
-                                  </a:solidFill>
-                                  <a:latin typeface="Cambria Math" panose="02040503050406030204" pitchFamily="18" charset="0"/>
-                                </a:rPr>
-                                <m:t>+1</m:t>
-                              </m:r>
                             </m:e>
                           </m:func>
                           <m:r>
@@ -9972,6 +9991,7 @@
                 </a:endParaRPr>
               </a:p>
               <a:p>
+                <a:pPr/>
                 <a14:m>
                   <m:oMathPara xmlns:m="http://schemas.openxmlformats.org/officeDocument/2006/math">
                     <m:oMathParaPr>
@@ -10065,13 +10085,13 @@
                         </m:sub>
                       </m:sSub>
                       <m:r>
-                        <a:rPr lang="sk-SK" sz="2800" i="1">
+                        <a:rPr lang="sk-SK" sz="2800" b="0" i="1" smtClean="0">
                           <a:solidFill>
                             <a:prstClr val="black"/>
                           </a:solidFill>
                           <a:latin typeface="Cambria Math" panose="02040503050406030204" pitchFamily="18" charset="0"/>
                         </a:rPr>
-                        <m:t>+</m:t>
+                        <m:t>−</m:t>
                       </m:r>
                       <m:f>
                         <m:fPr>
@@ -10364,17 +10384,17 @@
                                     </a:rPr>
                                     <m:t>𝑘</m:t>
                                   </m:r>
+                                  <m:r>
+                                    <a:rPr lang="sk-SK" sz="2800" b="0" i="1" smtClean="0">
+                                      <a:solidFill>
+                                        <a:prstClr val="black"/>
+                                      </a:solidFill>
+                                      <a:latin typeface="Cambria Math" panose="02040503050406030204" pitchFamily="18" charset="0"/>
+                                    </a:rPr>
+                                    <m:t>+1</m:t>
+                                  </m:r>
                                 </m:sub>
                               </m:sSub>
-                              <m:r>
-                                <a:rPr lang="sk-SK" sz="2800" i="1">
-                                  <a:solidFill>
-                                    <a:prstClr val="black"/>
-                                  </a:solidFill>
-                                  <a:latin typeface="Cambria Math" panose="02040503050406030204" pitchFamily="18" charset="0"/>
-                                </a:rPr>
-                                <m:t>+1</m:t>
-                              </m:r>
                             </m:e>
                           </m:func>
                           <m:r>
@@ -10461,6 +10481,7 @@
                 </a:endParaRPr>
               </a:p>
               <a:p>
+                <a:pPr/>
                 <a14:m>
                   <m:oMathPara xmlns:m="http://schemas.openxmlformats.org/officeDocument/2006/math">
                     <m:oMathParaPr>
@@ -10617,7 +10638,7 @@
             <p:spPr>
               <a:xfrm>
                 <a:off x="2129566" y="3866843"/>
-                <a:ext cx="7223388" cy="2310120"/>
+                <a:ext cx="7026347" cy="2310120"/>
               </a:xfrm>
               <a:prstGeom prst="rect">
                 <a:avLst/>
@@ -10828,8 +10849,8 @@
           </a:p>
         </p:txBody>
       </p:sp>
-      <mc:AlternateContent xmlns:mc="http://schemas.openxmlformats.org/markup-compatibility/2006">
-        <mc:Choice xmlns:a14="http://schemas.microsoft.com/office/drawing/2010/main" Requires="a14">
+      <mc:AlternateContent xmlns:mc="http://schemas.openxmlformats.org/markup-compatibility/2006" xmlns:a14="http://schemas.microsoft.com/office/drawing/2010/main">
+        <mc:Choice Requires="a14">
           <p:sp>
             <p:nvSpPr>
               <p:cNvPr id="11" name="Rectangle 10">
@@ -10857,6 +10878,7 @@
               </a:bodyPr>
               <a:lstStyle/>
               <a:p>
+                <a:pPr/>
                 <a14:m>
                   <m:oMathPara xmlns:m="http://schemas.openxmlformats.org/officeDocument/2006/math">
                     <m:oMathParaPr>
@@ -10880,7 +10902,7 @@
             </p:txBody>
           </p:sp>
         </mc:Choice>
-        <mc:Fallback>
+        <mc:Fallback xmlns="">
           <p:sp>
             <p:nvSpPr>
               <p:cNvPr id="11" name="Rectangle 10">
@@ -10925,8 +10947,8 @@
           </p:sp>
         </mc:Fallback>
       </mc:AlternateContent>
-      <mc:AlternateContent xmlns:mc="http://schemas.openxmlformats.org/markup-compatibility/2006">
-        <mc:Choice xmlns:a14="http://schemas.microsoft.com/office/drawing/2010/main" Requires="a14">
+      <mc:AlternateContent xmlns:mc="http://schemas.openxmlformats.org/markup-compatibility/2006" xmlns:a14="http://schemas.microsoft.com/office/drawing/2010/main">
+        <mc:Choice Requires="a14">
           <p:sp>
             <p:nvSpPr>
               <p:cNvPr id="12" name="Rectangle 11">
@@ -10954,6 +10976,7 @@
               </a:bodyPr>
               <a:lstStyle/>
               <a:p>
+                <a:pPr/>
                 <a14:m>
                   <m:oMathPara xmlns:m="http://schemas.openxmlformats.org/officeDocument/2006/math">
                     <m:oMathParaPr>
@@ -10977,7 +11000,7 @@
             </p:txBody>
           </p:sp>
         </mc:Choice>
-        <mc:Fallback>
+        <mc:Fallback xmlns="">
           <p:sp>
             <p:nvSpPr>
               <p:cNvPr id="12" name="Rectangle 11">
@@ -11658,8 +11681,8 @@
           </a:p>
         </p:txBody>
       </p:sp>
-      <mc:AlternateContent xmlns:mc="http://schemas.openxmlformats.org/markup-compatibility/2006">
-        <mc:Choice xmlns:a14="http://schemas.microsoft.com/office/drawing/2010/main" Requires="a14">
+      <mc:AlternateContent xmlns:mc="http://schemas.openxmlformats.org/markup-compatibility/2006" xmlns:a14="http://schemas.microsoft.com/office/drawing/2010/main">
+        <mc:Choice Requires="a14">
           <p:sp>
             <p:nvSpPr>
               <p:cNvPr id="4" name="Rectangle 3">
@@ -11687,6 +11710,7 @@
               </a:bodyPr>
               <a:lstStyle/>
               <a:p>
+                <a:pPr/>
                 <a14:m>
                   <m:oMathPara xmlns:m="http://schemas.openxmlformats.org/officeDocument/2006/math">
                     <m:oMathParaPr>
@@ -11862,6 +11886,7 @@
                 </a:endParaRPr>
               </a:p>
               <a:p>
+                <a:pPr/>
                 <a14:m>
                   <m:oMathPara xmlns:m="http://schemas.openxmlformats.org/officeDocument/2006/math">
                     <m:oMathParaPr>
@@ -11919,7 +11944,7 @@
             </p:txBody>
           </p:sp>
         </mc:Choice>
-        <mc:Fallback>
+        <mc:Fallback xmlns="">
           <p:sp>
             <p:nvSpPr>
               <p:cNvPr id="4" name="Rectangle 3">
@@ -12022,8 +12047,8 @@
           </a:p>
         </p:txBody>
       </p:sp>
-      <mc:AlternateContent xmlns:mc="http://schemas.openxmlformats.org/markup-compatibility/2006">
-        <mc:Choice xmlns:a14="http://schemas.microsoft.com/office/drawing/2010/main" Requires="a14">
+      <mc:AlternateContent xmlns:mc="http://schemas.openxmlformats.org/markup-compatibility/2006" xmlns:a14="http://schemas.microsoft.com/office/drawing/2010/main">
+        <mc:Choice Requires="a14">
           <p:sp>
             <p:nvSpPr>
               <p:cNvPr id="21" name="Content Placeholder 20">
@@ -12181,7 +12206,7 @@
             </p:txBody>
           </p:sp>
         </mc:Choice>
-        <mc:Fallback>
+        <mc:Fallback xmlns="">
           <p:sp>
             <p:nvSpPr>
               <p:cNvPr id="21" name="Content Placeholder 20">
@@ -12409,8 +12434,8 @@
           </a:p>
         </p:txBody>
       </p:sp>
-      <mc:AlternateContent xmlns:mc="http://schemas.openxmlformats.org/markup-compatibility/2006">
-        <mc:Choice xmlns:a14="http://schemas.microsoft.com/office/drawing/2010/main" Requires="a14">
+      <mc:AlternateContent xmlns:mc="http://schemas.openxmlformats.org/markup-compatibility/2006" xmlns:a14="http://schemas.microsoft.com/office/drawing/2010/main">
+        <mc:Choice Requires="a14">
           <p:sp>
             <p:nvSpPr>
               <p:cNvPr id="8" name="Rectangle 7">
@@ -12438,6 +12463,7 @@
               </a:bodyPr>
               <a:lstStyle/>
               <a:p>
+                <a:pPr/>
                 <a14:m>
                   <m:oMathPara xmlns:m="http://schemas.openxmlformats.org/officeDocument/2006/math">
                     <m:oMathParaPr>
@@ -12461,7 +12487,7 @@
             </p:txBody>
           </p:sp>
         </mc:Choice>
-        <mc:Fallback>
+        <mc:Fallback xmlns="">
           <p:sp>
             <p:nvSpPr>
               <p:cNvPr id="8" name="Rectangle 7">
@@ -12506,8 +12532,8 @@
           </p:sp>
         </mc:Fallback>
       </mc:AlternateContent>
-      <mc:AlternateContent xmlns:mc="http://schemas.openxmlformats.org/markup-compatibility/2006">
-        <mc:Choice xmlns:a14="http://schemas.microsoft.com/office/drawing/2010/main" Requires="a14">
+      <mc:AlternateContent xmlns:mc="http://schemas.openxmlformats.org/markup-compatibility/2006" xmlns:a14="http://schemas.microsoft.com/office/drawing/2010/main">
+        <mc:Choice Requires="a14">
           <p:sp>
             <p:nvSpPr>
               <p:cNvPr id="9" name="Rectangle 8">
@@ -12535,6 +12561,7 @@
               </a:bodyPr>
               <a:lstStyle/>
               <a:p>
+                <a:pPr/>
                 <a14:m>
                   <m:oMathPara xmlns:m="http://schemas.openxmlformats.org/officeDocument/2006/math">
                     <m:oMathParaPr>
@@ -12558,7 +12585,7 @@
             </p:txBody>
           </p:sp>
         </mc:Choice>
-        <mc:Fallback>
+        <mc:Fallback xmlns="">
           <p:sp>
             <p:nvSpPr>
               <p:cNvPr id="9" name="Rectangle 8">
@@ -12854,8 +12881,8 @@
           </a:p>
         </p:txBody>
       </p:sp>
-      <mc:AlternateContent xmlns:mc="http://schemas.openxmlformats.org/markup-compatibility/2006">
-        <mc:Choice xmlns:a14="http://schemas.microsoft.com/office/drawing/2010/main" Requires="a14">
+      <mc:AlternateContent xmlns:mc="http://schemas.openxmlformats.org/markup-compatibility/2006" xmlns:a14="http://schemas.microsoft.com/office/drawing/2010/main">
+        <mc:Choice Requires="a14">
           <p:sp>
             <p:nvSpPr>
               <p:cNvPr id="7" name="TextBox 6">
@@ -12884,6 +12911,7 @@
               </a:bodyPr>
               <a:lstStyle/>
               <a:p>
+                <a:pPr/>
                 <a14:m>
                   <m:oMathPara xmlns:m="http://schemas.openxmlformats.org/officeDocument/2006/math">
                     <m:oMathParaPr>
@@ -12904,7 +12932,7 @@
             </p:txBody>
           </p:sp>
         </mc:Choice>
-        <mc:Fallback>
+        <mc:Fallback xmlns="">
           <p:sp>
             <p:nvSpPr>
               <p:cNvPr id="7" name="TextBox 6">
@@ -13514,8 +13542,8 @@
           </a:p>
         </p:txBody>
       </p:sp>
-      <mc:AlternateContent xmlns:mc="http://schemas.openxmlformats.org/markup-compatibility/2006">
-        <mc:Choice xmlns:a14="http://schemas.microsoft.com/office/drawing/2010/main" Requires="a14">
+      <mc:AlternateContent xmlns:mc="http://schemas.openxmlformats.org/markup-compatibility/2006" xmlns:a14="http://schemas.microsoft.com/office/drawing/2010/main">
+        <mc:Choice Requires="a14">
           <p:sp>
             <p:nvSpPr>
               <p:cNvPr id="8" name="Rectangle 7">
@@ -13543,6 +13571,7 @@
               </a:bodyPr>
               <a:lstStyle/>
               <a:p>
+                <a:pPr/>
                 <a14:m>
                   <m:oMathPara xmlns:m="http://schemas.openxmlformats.org/officeDocument/2006/math">
                     <m:oMathParaPr>
@@ -13566,7 +13595,7 @@
             </p:txBody>
           </p:sp>
         </mc:Choice>
-        <mc:Fallback>
+        <mc:Fallback xmlns="">
           <p:sp>
             <p:nvSpPr>
               <p:cNvPr id="8" name="Rectangle 7">
@@ -13611,8 +13640,8 @@
           </p:sp>
         </mc:Fallback>
       </mc:AlternateContent>
-      <mc:AlternateContent xmlns:mc="http://schemas.openxmlformats.org/markup-compatibility/2006">
-        <mc:Choice xmlns:a14="http://schemas.microsoft.com/office/drawing/2010/main" Requires="a14">
+      <mc:AlternateContent xmlns:mc="http://schemas.openxmlformats.org/markup-compatibility/2006" xmlns:a14="http://schemas.microsoft.com/office/drawing/2010/main">
+        <mc:Choice Requires="a14">
           <p:sp>
             <p:nvSpPr>
               <p:cNvPr id="9" name="Rectangle 8">
@@ -13640,6 +13669,7 @@
               </a:bodyPr>
               <a:lstStyle/>
               <a:p>
+                <a:pPr/>
                 <a14:m>
                   <m:oMathPara xmlns:m="http://schemas.openxmlformats.org/officeDocument/2006/math">
                     <m:oMathParaPr>
@@ -13663,7 +13693,7 @@
             </p:txBody>
           </p:sp>
         </mc:Choice>
-        <mc:Fallback>
+        <mc:Fallback xmlns="">
           <p:sp>
             <p:nvSpPr>
               <p:cNvPr id="9" name="Rectangle 8">
@@ -14178,8 +14208,8 @@
           </a:p>
         </p:txBody>
       </p:sp>
-      <mc:AlternateContent xmlns:mc="http://schemas.openxmlformats.org/markup-compatibility/2006">
-        <mc:Choice xmlns:a14="http://schemas.microsoft.com/office/drawing/2010/main" Requires="a14">
+      <mc:AlternateContent xmlns:mc="http://schemas.openxmlformats.org/markup-compatibility/2006" xmlns:a14="http://schemas.microsoft.com/office/drawing/2010/main">
+        <mc:Choice Requires="a14">
           <p:sp>
             <p:nvSpPr>
               <p:cNvPr id="8" name="Rectangle 7">
@@ -14207,6 +14237,7 @@
               </a:bodyPr>
               <a:lstStyle/>
               <a:p>
+                <a:pPr/>
                 <a14:m>
                   <m:oMathPara xmlns:m="http://schemas.openxmlformats.org/officeDocument/2006/math">
                     <m:oMathParaPr>
@@ -14230,7 +14261,7 @@
             </p:txBody>
           </p:sp>
         </mc:Choice>
-        <mc:Fallback>
+        <mc:Fallback xmlns="">
           <p:sp>
             <p:nvSpPr>
               <p:cNvPr id="8" name="Rectangle 7">
@@ -14275,8 +14306,8 @@
           </p:sp>
         </mc:Fallback>
       </mc:AlternateContent>
-      <mc:AlternateContent xmlns:mc="http://schemas.openxmlformats.org/markup-compatibility/2006">
-        <mc:Choice xmlns:a14="http://schemas.microsoft.com/office/drawing/2010/main" Requires="a14">
+      <mc:AlternateContent xmlns:mc="http://schemas.openxmlformats.org/markup-compatibility/2006" xmlns:a14="http://schemas.microsoft.com/office/drawing/2010/main">
+        <mc:Choice Requires="a14">
           <p:sp>
             <p:nvSpPr>
               <p:cNvPr id="9" name="Rectangle 8">
@@ -14304,6 +14335,7 @@
               </a:bodyPr>
               <a:lstStyle/>
               <a:p>
+                <a:pPr/>
                 <a14:m>
                   <m:oMathPara xmlns:m="http://schemas.openxmlformats.org/officeDocument/2006/math">
                     <m:oMathParaPr>
@@ -14327,7 +14359,7 @@
             </p:txBody>
           </p:sp>
         </mc:Choice>
-        <mc:Fallback>
+        <mc:Fallback xmlns="">
           <p:sp>
             <p:nvSpPr>
               <p:cNvPr id="9" name="Rectangle 8">
@@ -14902,8 +14934,8 @@
           </a:p>
         </p:txBody>
       </p:sp>
-      <mc:AlternateContent xmlns:mc="http://schemas.openxmlformats.org/markup-compatibility/2006">
-        <mc:Choice xmlns:a14="http://schemas.microsoft.com/office/drawing/2010/main" Requires="a14">
+      <mc:AlternateContent xmlns:mc="http://schemas.openxmlformats.org/markup-compatibility/2006" xmlns:a14="http://schemas.microsoft.com/office/drawing/2010/main">
+        <mc:Choice Requires="a14">
           <p:sp>
             <p:nvSpPr>
               <p:cNvPr id="8" name="Rectangle 7">
@@ -14931,6 +14963,7 @@
               </a:bodyPr>
               <a:lstStyle/>
               <a:p>
+                <a:pPr/>
                 <a14:m>
                   <m:oMathPara xmlns:m="http://schemas.openxmlformats.org/officeDocument/2006/math">
                     <m:oMathParaPr>
@@ -14954,7 +14987,7 @@
             </p:txBody>
           </p:sp>
         </mc:Choice>
-        <mc:Fallback>
+        <mc:Fallback xmlns="">
           <p:sp>
             <p:nvSpPr>
               <p:cNvPr id="8" name="Rectangle 7">
@@ -14999,8 +15032,8 @@
           </p:sp>
         </mc:Fallback>
       </mc:AlternateContent>
-      <mc:AlternateContent xmlns:mc="http://schemas.openxmlformats.org/markup-compatibility/2006">
-        <mc:Choice xmlns:a14="http://schemas.microsoft.com/office/drawing/2010/main" Requires="a14">
+      <mc:AlternateContent xmlns:mc="http://schemas.openxmlformats.org/markup-compatibility/2006" xmlns:a14="http://schemas.microsoft.com/office/drawing/2010/main">
+        <mc:Choice Requires="a14">
           <p:sp>
             <p:nvSpPr>
               <p:cNvPr id="9" name="Rectangle 8">
@@ -15028,6 +15061,7 @@
               </a:bodyPr>
               <a:lstStyle/>
               <a:p>
+                <a:pPr/>
                 <a14:m>
                   <m:oMathPara xmlns:m="http://schemas.openxmlformats.org/officeDocument/2006/math">
                     <m:oMathParaPr>
@@ -15051,7 +15085,7 @@
             </p:txBody>
           </p:sp>
         </mc:Choice>
-        <mc:Fallback>
+        <mc:Fallback xmlns="">
           <p:sp>
             <p:nvSpPr>
               <p:cNvPr id="9" name="Rectangle 8">
@@ -15630,8 +15664,8 @@
           </a:p>
         </p:txBody>
       </p:sp>
-      <mc:AlternateContent xmlns:mc="http://schemas.openxmlformats.org/markup-compatibility/2006">
-        <mc:Choice xmlns:a14="http://schemas.microsoft.com/office/drawing/2010/main" Requires="a14">
+      <mc:AlternateContent xmlns:mc="http://schemas.openxmlformats.org/markup-compatibility/2006" xmlns:a14="http://schemas.microsoft.com/office/drawing/2010/main">
+        <mc:Choice Requires="a14">
           <p:sp>
             <p:nvSpPr>
               <p:cNvPr id="8" name="Rectangle 7">
@@ -15659,6 +15693,7 @@
               </a:bodyPr>
               <a:lstStyle/>
               <a:p>
+                <a:pPr/>
                 <a14:m>
                   <m:oMathPara xmlns:m="http://schemas.openxmlformats.org/officeDocument/2006/math">
                     <m:oMathParaPr>
@@ -15682,7 +15717,7 @@
             </p:txBody>
           </p:sp>
         </mc:Choice>
-        <mc:Fallback>
+        <mc:Fallback xmlns="">
           <p:sp>
             <p:nvSpPr>
               <p:cNvPr id="8" name="Rectangle 7">
@@ -15727,8 +15762,8 @@
           </p:sp>
         </mc:Fallback>
       </mc:AlternateContent>
-      <mc:AlternateContent xmlns:mc="http://schemas.openxmlformats.org/markup-compatibility/2006">
-        <mc:Choice xmlns:a14="http://schemas.microsoft.com/office/drawing/2010/main" Requires="a14">
+      <mc:AlternateContent xmlns:mc="http://schemas.openxmlformats.org/markup-compatibility/2006" xmlns:a14="http://schemas.microsoft.com/office/drawing/2010/main">
+        <mc:Choice Requires="a14">
           <p:sp>
             <p:nvSpPr>
               <p:cNvPr id="9" name="Rectangle 8">
@@ -15756,6 +15791,7 @@
               </a:bodyPr>
               <a:lstStyle/>
               <a:p>
+                <a:pPr/>
                 <a14:m>
                   <m:oMathPara xmlns:m="http://schemas.openxmlformats.org/officeDocument/2006/math">
                     <m:oMathParaPr>
@@ -15779,7 +15815,7 @@
             </p:txBody>
           </p:sp>
         </mc:Choice>
-        <mc:Fallback>
+        <mc:Fallback xmlns="">
           <p:sp>
             <p:nvSpPr>
               <p:cNvPr id="9" name="Rectangle 8">
@@ -16346,8 +16382,8 @@
           </a:p>
         </p:txBody>
       </p:sp>
-      <mc:AlternateContent xmlns:mc="http://schemas.openxmlformats.org/markup-compatibility/2006">
-        <mc:Choice xmlns:a14="http://schemas.microsoft.com/office/drawing/2010/main" Requires="a14">
+      <mc:AlternateContent xmlns:mc="http://schemas.openxmlformats.org/markup-compatibility/2006" xmlns:a14="http://schemas.microsoft.com/office/drawing/2010/main">
+        <mc:Choice Requires="a14">
           <p:sp>
             <p:nvSpPr>
               <p:cNvPr id="8" name="Rectangle 7">
@@ -16375,6 +16411,7 @@
               </a:bodyPr>
               <a:lstStyle/>
               <a:p>
+                <a:pPr/>
                 <a14:m>
                   <m:oMathPara xmlns:m="http://schemas.openxmlformats.org/officeDocument/2006/math">
                     <m:oMathParaPr>
@@ -16398,7 +16435,7 @@
             </p:txBody>
           </p:sp>
         </mc:Choice>
-        <mc:Fallback>
+        <mc:Fallback xmlns="">
           <p:sp>
             <p:nvSpPr>
               <p:cNvPr id="8" name="Rectangle 7">
@@ -16443,8 +16480,8 @@
           </p:sp>
         </mc:Fallback>
       </mc:AlternateContent>
-      <mc:AlternateContent xmlns:mc="http://schemas.openxmlformats.org/markup-compatibility/2006">
-        <mc:Choice xmlns:a14="http://schemas.microsoft.com/office/drawing/2010/main" Requires="a14">
+      <mc:AlternateContent xmlns:mc="http://schemas.openxmlformats.org/markup-compatibility/2006" xmlns:a14="http://schemas.microsoft.com/office/drawing/2010/main">
+        <mc:Choice Requires="a14">
           <p:sp>
             <p:nvSpPr>
               <p:cNvPr id="9" name="Rectangle 8">
@@ -16472,6 +16509,7 @@
               </a:bodyPr>
               <a:lstStyle/>
               <a:p>
+                <a:pPr/>
                 <a14:m>
                   <m:oMathPara xmlns:m="http://schemas.openxmlformats.org/officeDocument/2006/math">
                     <m:oMathParaPr>
@@ -16495,7 +16533,7 @@
             </p:txBody>
           </p:sp>
         </mc:Choice>
-        <mc:Fallback>
+        <mc:Fallback xmlns="">
           <p:sp>
             <p:nvSpPr>
               <p:cNvPr id="9" name="Rectangle 8">
@@ -17104,8 +17142,8 @@
           </a:p>
         </p:txBody>
       </p:sp>
-      <mc:AlternateContent xmlns:mc="http://schemas.openxmlformats.org/markup-compatibility/2006">
-        <mc:Choice xmlns:a14="http://schemas.microsoft.com/office/drawing/2010/main" Requires="a14">
+      <mc:AlternateContent xmlns:mc="http://schemas.openxmlformats.org/markup-compatibility/2006" xmlns:a14="http://schemas.microsoft.com/office/drawing/2010/main">
+        <mc:Choice Requires="a14">
           <p:sp>
             <p:nvSpPr>
               <p:cNvPr id="8" name="Rectangle 7">
@@ -17133,6 +17171,7 @@
               </a:bodyPr>
               <a:lstStyle/>
               <a:p>
+                <a:pPr/>
                 <a14:m>
                   <m:oMathPara xmlns:m="http://schemas.openxmlformats.org/officeDocument/2006/math">
                     <m:oMathParaPr>
@@ -17156,7 +17195,7 @@
             </p:txBody>
           </p:sp>
         </mc:Choice>
-        <mc:Fallback>
+        <mc:Fallback xmlns="">
           <p:sp>
             <p:nvSpPr>
               <p:cNvPr id="8" name="Rectangle 7">
@@ -17201,8 +17240,8 @@
           </p:sp>
         </mc:Fallback>
       </mc:AlternateContent>
-      <mc:AlternateContent xmlns:mc="http://schemas.openxmlformats.org/markup-compatibility/2006">
-        <mc:Choice xmlns:a14="http://schemas.microsoft.com/office/drawing/2010/main" Requires="a14">
+      <mc:AlternateContent xmlns:mc="http://schemas.openxmlformats.org/markup-compatibility/2006" xmlns:a14="http://schemas.microsoft.com/office/drawing/2010/main">
+        <mc:Choice Requires="a14">
           <p:sp>
             <p:nvSpPr>
               <p:cNvPr id="9" name="Rectangle 8">
@@ -17230,6 +17269,7 @@
               </a:bodyPr>
               <a:lstStyle/>
               <a:p>
+                <a:pPr/>
                 <a14:m>
                   <m:oMathPara xmlns:m="http://schemas.openxmlformats.org/officeDocument/2006/math">
                     <m:oMathParaPr>
@@ -17253,7 +17293,7 @@
             </p:txBody>
           </p:sp>
         </mc:Choice>
-        <mc:Fallback>
+        <mc:Fallback xmlns="">
           <p:sp>
             <p:nvSpPr>
               <p:cNvPr id="9" name="Rectangle 8">
@@ -17850,8 +17890,8 @@
           </a:p>
         </p:txBody>
       </p:sp>
-      <mc:AlternateContent xmlns:mc="http://schemas.openxmlformats.org/markup-compatibility/2006">
-        <mc:Choice xmlns:a14="http://schemas.microsoft.com/office/drawing/2010/main" Requires="a14">
+      <mc:AlternateContent xmlns:mc="http://schemas.openxmlformats.org/markup-compatibility/2006" xmlns:a14="http://schemas.microsoft.com/office/drawing/2010/main">
+        <mc:Choice Requires="a14">
           <p:sp>
             <p:nvSpPr>
               <p:cNvPr id="8" name="Rectangle 7">
@@ -17879,6 +17919,7 @@
               </a:bodyPr>
               <a:lstStyle/>
               <a:p>
+                <a:pPr/>
                 <a14:m>
                   <m:oMathPara xmlns:m="http://schemas.openxmlformats.org/officeDocument/2006/math">
                     <m:oMathParaPr>
@@ -17902,7 +17943,7 @@
             </p:txBody>
           </p:sp>
         </mc:Choice>
-        <mc:Fallback>
+        <mc:Fallback xmlns="">
           <p:sp>
             <p:nvSpPr>
               <p:cNvPr id="8" name="Rectangle 7">
@@ -17947,8 +17988,8 @@
           </p:sp>
         </mc:Fallback>
       </mc:AlternateContent>
-      <mc:AlternateContent xmlns:mc="http://schemas.openxmlformats.org/markup-compatibility/2006">
-        <mc:Choice xmlns:a14="http://schemas.microsoft.com/office/drawing/2010/main" Requires="a14">
+      <mc:AlternateContent xmlns:mc="http://schemas.openxmlformats.org/markup-compatibility/2006" xmlns:a14="http://schemas.microsoft.com/office/drawing/2010/main">
+        <mc:Choice Requires="a14">
           <p:sp>
             <p:nvSpPr>
               <p:cNvPr id="9" name="Rectangle 8">
@@ -17976,6 +18017,7 @@
               </a:bodyPr>
               <a:lstStyle/>
               <a:p>
+                <a:pPr/>
                 <a14:m>
                   <m:oMathPara xmlns:m="http://schemas.openxmlformats.org/officeDocument/2006/math">
                     <m:oMathParaPr>
@@ -17999,7 +18041,7 @@
             </p:txBody>
           </p:sp>
         </mc:Choice>
-        <mc:Fallback>
+        <mc:Fallback xmlns="">
           <p:sp>
             <p:nvSpPr>
               <p:cNvPr id="9" name="Rectangle 8">
@@ -19008,8 +19050,8 @@
           </a:p>
         </p:txBody>
       </p:sp>
-      <mc:AlternateContent xmlns:mc="http://schemas.openxmlformats.org/markup-compatibility/2006">
-        <mc:Choice xmlns:a14="http://schemas.microsoft.com/office/drawing/2010/main" Requires="a14">
+      <mc:AlternateContent xmlns:mc="http://schemas.openxmlformats.org/markup-compatibility/2006" xmlns:a14="http://schemas.microsoft.com/office/drawing/2010/main">
+        <mc:Choice Requires="a14">
           <p:sp>
             <p:nvSpPr>
               <p:cNvPr id="8" name="Rectangle 7">
@@ -19037,6 +19079,7 @@
               </a:bodyPr>
               <a:lstStyle/>
               <a:p>
+                <a:pPr/>
                 <a14:m>
                   <m:oMathPara xmlns:m="http://schemas.openxmlformats.org/officeDocument/2006/math">
                     <m:oMathParaPr>
@@ -19060,7 +19103,7 @@
             </p:txBody>
           </p:sp>
         </mc:Choice>
-        <mc:Fallback>
+        <mc:Fallback xmlns="">
           <p:sp>
             <p:nvSpPr>
               <p:cNvPr id="8" name="Rectangle 7">
@@ -19105,8 +19148,8 @@
           </p:sp>
         </mc:Fallback>
       </mc:AlternateContent>
-      <mc:AlternateContent xmlns:mc="http://schemas.openxmlformats.org/markup-compatibility/2006">
-        <mc:Choice xmlns:a14="http://schemas.microsoft.com/office/drawing/2010/main" Requires="a14">
+      <mc:AlternateContent xmlns:mc="http://schemas.openxmlformats.org/markup-compatibility/2006" xmlns:a14="http://schemas.microsoft.com/office/drawing/2010/main">
+        <mc:Choice Requires="a14">
           <p:sp>
             <p:nvSpPr>
               <p:cNvPr id="9" name="Rectangle 8">
@@ -19134,6 +19177,7 @@
               </a:bodyPr>
               <a:lstStyle/>
               <a:p>
+                <a:pPr/>
                 <a14:m>
                   <m:oMathPara xmlns:m="http://schemas.openxmlformats.org/officeDocument/2006/math">
                     <m:oMathParaPr>
@@ -19157,7 +19201,7 @@
             </p:txBody>
           </p:sp>
         </mc:Choice>
-        <mc:Fallback>
+        <mc:Fallback xmlns="">
           <p:sp>
             <p:nvSpPr>
               <p:cNvPr id="9" name="Rectangle 8">
@@ -19672,8 +19716,8 @@
           </a:p>
         </p:txBody>
       </p:sp>
-      <mc:AlternateContent xmlns:mc="http://schemas.openxmlformats.org/markup-compatibility/2006">
-        <mc:Choice xmlns:a14="http://schemas.microsoft.com/office/drawing/2010/main" Requires="a14">
+      <mc:AlternateContent xmlns:mc="http://schemas.openxmlformats.org/markup-compatibility/2006" xmlns:a14="http://schemas.microsoft.com/office/drawing/2010/main">
+        <mc:Choice Requires="a14">
           <p:sp>
             <p:nvSpPr>
               <p:cNvPr id="8" name="Rectangle 7">
@@ -19701,6 +19745,7 @@
               </a:bodyPr>
               <a:lstStyle/>
               <a:p>
+                <a:pPr/>
                 <a14:m>
                   <m:oMathPara xmlns:m="http://schemas.openxmlformats.org/officeDocument/2006/math">
                     <m:oMathParaPr>
@@ -19724,7 +19769,7 @@
             </p:txBody>
           </p:sp>
         </mc:Choice>
-        <mc:Fallback>
+        <mc:Fallback xmlns="">
           <p:sp>
             <p:nvSpPr>
               <p:cNvPr id="8" name="Rectangle 7">
@@ -19769,8 +19814,8 @@
           </p:sp>
         </mc:Fallback>
       </mc:AlternateContent>
-      <mc:AlternateContent xmlns:mc="http://schemas.openxmlformats.org/markup-compatibility/2006">
-        <mc:Choice xmlns:a14="http://schemas.microsoft.com/office/drawing/2010/main" Requires="a14">
+      <mc:AlternateContent xmlns:mc="http://schemas.openxmlformats.org/markup-compatibility/2006" xmlns:a14="http://schemas.microsoft.com/office/drawing/2010/main">
+        <mc:Choice Requires="a14">
           <p:sp>
             <p:nvSpPr>
               <p:cNvPr id="9" name="Rectangle 8">
@@ -19798,6 +19843,7 @@
               </a:bodyPr>
               <a:lstStyle/>
               <a:p>
+                <a:pPr/>
                 <a14:m>
                   <m:oMathPara xmlns:m="http://schemas.openxmlformats.org/officeDocument/2006/math">
                     <m:oMathParaPr>
@@ -19821,7 +19867,7 @@
             </p:txBody>
           </p:sp>
         </mc:Choice>
-        <mc:Fallback>
+        <mc:Fallback xmlns="">
           <p:sp>
             <p:nvSpPr>
               <p:cNvPr id="9" name="Rectangle 8">
@@ -20494,8 +20540,8 @@
           </a:p>
         </p:txBody>
       </p:sp>
-      <mc:AlternateContent xmlns:mc="http://schemas.openxmlformats.org/markup-compatibility/2006">
-        <mc:Choice xmlns:a14="http://schemas.microsoft.com/office/drawing/2010/main" Requires="a14">
+      <mc:AlternateContent xmlns:mc="http://schemas.openxmlformats.org/markup-compatibility/2006" xmlns:a14="http://schemas.microsoft.com/office/drawing/2010/main">
+        <mc:Choice Requires="a14">
           <p:sp>
             <p:nvSpPr>
               <p:cNvPr id="8" name="Rectangle 7">
@@ -20523,6 +20569,7 @@
               </a:bodyPr>
               <a:lstStyle/>
               <a:p>
+                <a:pPr/>
                 <a14:m>
                   <m:oMathPara xmlns:m="http://schemas.openxmlformats.org/officeDocument/2006/math">
                     <m:oMathParaPr>
@@ -20546,7 +20593,7 @@
             </p:txBody>
           </p:sp>
         </mc:Choice>
-        <mc:Fallback>
+        <mc:Fallback xmlns="">
           <p:sp>
             <p:nvSpPr>
               <p:cNvPr id="8" name="Rectangle 7">
@@ -20591,8 +20638,8 @@
           </p:sp>
         </mc:Fallback>
       </mc:AlternateContent>
-      <mc:AlternateContent xmlns:mc="http://schemas.openxmlformats.org/markup-compatibility/2006">
-        <mc:Choice xmlns:a14="http://schemas.microsoft.com/office/drawing/2010/main" Requires="a14">
+      <mc:AlternateContent xmlns:mc="http://schemas.openxmlformats.org/markup-compatibility/2006" xmlns:a14="http://schemas.microsoft.com/office/drawing/2010/main">
+        <mc:Choice Requires="a14">
           <p:sp>
             <p:nvSpPr>
               <p:cNvPr id="9" name="Rectangle 8">
@@ -20620,6 +20667,7 @@
               </a:bodyPr>
               <a:lstStyle/>
               <a:p>
+                <a:pPr/>
                 <a14:m>
                   <m:oMathPara xmlns:m="http://schemas.openxmlformats.org/officeDocument/2006/math">
                     <m:oMathParaPr>
@@ -20643,7 +20691,7 @@
             </p:txBody>
           </p:sp>
         </mc:Choice>
-        <mc:Fallback>
+        <mc:Fallback xmlns="">
           <p:sp>
             <p:nvSpPr>
               <p:cNvPr id="9" name="Rectangle 8">
@@ -21319,8 +21367,8 @@
           </a:p>
         </p:txBody>
       </p:sp>
-      <mc:AlternateContent xmlns:mc="http://schemas.openxmlformats.org/markup-compatibility/2006">
-        <mc:Choice xmlns:a14="http://schemas.microsoft.com/office/drawing/2010/main" Requires="a14">
+      <mc:AlternateContent xmlns:mc="http://schemas.openxmlformats.org/markup-compatibility/2006" xmlns:a14="http://schemas.microsoft.com/office/drawing/2010/main">
+        <mc:Choice Requires="a14">
           <p:sp>
             <p:nvSpPr>
               <p:cNvPr id="8" name="Rectangle 7">
@@ -21348,6 +21396,7 @@
               </a:bodyPr>
               <a:lstStyle/>
               <a:p>
+                <a:pPr/>
                 <a14:m>
                   <m:oMathPara xmlns:m="http://schemas.openxmlformats.org/officeDocument/2006/math">
                     <m:oMathParaPr>
@@ -21371,7 +21420,7 @@
             </p:txBody>
           </p:sp>
         </mc:Choice>
-        <mc:Fallback>
+        <mc:Fallback xmlns="">
           <p:sp>
             <p:nvSpPr>
               <p:cNvPr id="8" name="Rectangle 7">
@@ -21416,8 +21465,8 @@
           </p:sp>
         </mc:Fallback>
       </mc:AlternateContent>
-      <mc:AlternateContent xmlns:mc="http://schemas.openxmlformats.org/markup-compatibility/2006">
-        <mc:Choice xmlns:a14="http://schemas.microsoft.com/office/drawing/2010/main" Requires="a14">
+      <mc:AlternateContent xmlns:mc="http://schemas.openxmlformats.org/markup-compatibility/2006" xmlns:a14="http://schemas.microsoft.com/office/drawing/2010/main">
+        <mc:Choice Requires="a14">
           <p:sp>
             <p:nvSpPr>
               <p:cNvPr id="9" name="Rectangle 8">
@@ -21445,6 +21494,7 @@
               </a:bodyPr>
               <a:lstStyle/>
               <a:p>
+                <a:pPr/>
                 <a14:m>
                   <m:oMathPara xmlns:m="http://schemas.openxmlformats.org/officeDocument/2006/math">
                     <m:oMathParaPr>
@@ -21468,7 +21518,7 @@
             </p:txBody>
           </p:sp>
         </mc:Choice>
-        <mc:Fallback>
+        <mc:Fallback xmlns="">
           <p:sp>
             <p:nvSpPr>
               <p:cNvPr id="9" name="Rectangle 8">
@@ -22143,8 +22193,8 @@
           </a:p>
         </p:txBody>
       </p:sp>
-      <mc:AlternateContent xmlns:mc="http://schemas.openxmlformats.org/markup-compatibility/2006">
-        <mc:Choice xmlns:a14="http://schemas.microsoft.com/office/drawing/2010/main" Requires="a14">
+      <mc:AlternateContent xmlns:mc="http://schemas.openxmlformats.org/markup-compatibility/2006" xmlns:a14="http://schemas.microsoft.com/office/drawing/2010/main">
+        <mc:Choice Requires="a14">
           <p:sp>
             <p:nvSpPr>
               <p:cNvPr id="8" name="Rectangle 7">
@@ -22172,6 +22222,7 @@
               </a:bodyPr>
               <a:lstStyle/>
               <a:p>
+                <a:pPr/>
                 <a14:m>
                   <m:oMathPara xmlns:m="http://schemas.openxmlformats.org/officeDocument/2006/math">
                     <m:oMathParaPr>
@@ -22195,7 +22246,7 @@
             </p:txBody>
           </p:sp>
         </mc:Choice>
-        <mc:Fallback>
+        <mc:Fallback xmlns="">
           <p:sp>
             <p:nvSpPr>
               <p:cNvPr id="8" name="Rectangle 7">
@@ -22240,8 +22291,8 @@
           </p:sp>
         </mc:Fallback>
       </mc:AlternateContent>
-      <mc:AlternateContent xmlns:mc="http://schemas.openxmlformats.org/markup-compatibility/2006">
-        <mc:Choice xmlns:a14="http://schemas.microsoft.com/office/drawing/2010/main" Requires="a14">
+      <mc:AlternateContent xmlns:mc="http://schemas.openxmlformats.org/markup-compatibility/2006" xmlns:a14="http://schemas.microsoft.com/office/drawing/2010/main">
+        <mc:Choice Requires="a14">
           <p:sp>
             <p:nvSpPr>
               <p:cNvPr id="9" name="Rectangle 8">
@@ -22269,6 +22320,7 @@
               </a:bodyPr>
               <a:lstStyle/>
               <a:p>
+                <a:pPr/>
                 <a14:m>
                   <m:oMathPara xmlns:m="http://schemas.openxmlformats.org/officeDocument/2006/math">
                     <m:oMathParaPr>
@@ -22292,7 +22344,7 @@
             </p:txBody>
           </p:sp>
         </mc:Choice>
-        <mc:Fallback>
+        <mc:Fallback xmlns="">
           <p:sp>
             <p:nvSpPr>
               <p:cNvPr id="9" name="Rectangle 8">
@@ -22967,8 +23019,8 @@
           </a:p>
         </p:txBody>
       </p:sp>
-      <mc:AlternateContent xmlns:mc="http://schemas.openxmlformats.org/markup-compatibility/2006">
-        <mc:Choice xmlns:a14="http://schemas.microsoft.com/office/drawing/2010/main" Requires="a14">
+      <mc:AlternateContent xmlns:mc="http://schemas.openxmlformats.org/markup-compatibility/2006" xmlns:a14="http://schemas.microsoft.com/office/drawing/2010/main">
+        <mc:Choice Requires="a14">
           <p:sp>
             <p:nvSpPr>
               <p:cNvPr id="8" name="Rectangle 7">
@@ -22996,6 +23048,7 @@
               </a:bodyPr>
               <a:lstStyle/>
               <a:p>
+                <a:pPr/>
                 <a14:m>
                   <m:oMathPara xmlns:m="http://schemas.openxmlformats.org/officeDocument/2006/math">
                     <m:oMathParaPr>
@@ -23019,7 +23072,7 @@
             </p:txBody>
           </p:sp>
         </mc:Choice>
-        <mc:Fallback>
+        <mc:Fallback xmlns="">
           <p:sp>
             <p:nvSpPr>
               <p:cNvPr id="8" name="Rectangle 7">
@@ -23064,8 +23117,8 @@
           </p:sp>
         </mc:Fallback>
       </mc:AlternateContent>
-      <mc:AlternateContent xmlns:mc="http://schemas.openxmlformats.org/markup-compatibility/2006">
-        <mc:Choice xmlns:a14="http://schemas.microsoft.com/office/drawing/2010/main" Requires="a14">
+      <mc:AlternateContent xmlns:mc="http://schemas.openxmlformats.org/markup-compatibility/2006" xmlns:a14="http://schemas.microsoft.com/office/drawing/2010/main">
+        <mc:Choice Requires="a14">
           <p:sp>
             <p:nvSpPr>
               <p:cNvPr id="9" name="Rectangle 8">
@@ -23093,6 +23146,7 @@
               </a:bodyPr>
               <a:lstStyle/>
               <a:p>
+                <a:pPr/>
                 <a14:m>
                   <m:oMathPara xmlns:m="http://schemas.openxmlformats.org/officeDocument/2006/math">
                     <m:oMathParaPr>
@@ -23116,7 +23170,7 @@
             </p:txBody>
           </p:sp>
         </mc:Choice>
-        <mc:Fallback>
+        <mc:Fallback xmlns="">
           <p:sp>
             <p:nvSpPr>
               <p:cNvPr id="9" name="Rectangle 8">
@@ -23791,8 +23845,8 @@
           </a:p>
         </p:txBody>
       </p:sp>
-      <mc:AlternateContent xmlns:mc="http://schemas.openxmlformats.org/markup-compatibility/2006">
-        <mc:Choice xmlns:a14="http://schemas.microsoft.com/office/drawing/2010/main" Requires="a14">
+      <mc:AlternateContent xmlns:mc="http://schemas.openxmlformats.org/markup-compatibility/2006" xmlns:a14="http://schemas.microsoft.com/office/drawing/2010/main">
+        <mc:Choice Requires="a14">
           <p:sp>
             <p:nvSpPr>
               <p:cNvPr id="8" name="Rectangle 7">
@@ -23820,6 +23874,7 @@
               </a:bodyPr>
               <a:lstStyle/>
               <a:p>
+                <a:pPr/>
                 <a14:m>
                   <m:oMathPara xmlns:m="http://schemas.openxmlformats.org/officeDocument/2006/math">
                     <m:oMathParaPr>
@@ -23843,7 +23898,7 @@
             </p:txBody>
           </p:sp>
         </mc:Choice>
-        <mc:Fallback>
+        <mc:Fallback xmlns="">
           <p:sp>
             <p:nvSpPr>
               <p:cNvPr id="8" name="Rectangle 7">
@@ -23888,8 +23943,8 @@
           </p:sp>
         </mc:Fallback>
       </mc:AlternateContent>
-      <mc:AlternateContent xmlns:mc="http://schemas.openxmlformats.org/markup-compatibility/2006">
-        <mc:Choice xmlns:a14="http://schemas.microsoft.com/office/drawing/2010/main" Requires="a14">
+      <mc:AlternateContent xmlns:mc="http://schemas.openxmlformats.org/markup-compatibility/2006" xmlns:a14="http://schemas.microsoft.com/office/drawing/2010/main">
+        <mc:Choice Requires="a14">
           <p:sp>
             <p:nvSpPr>
               <p:cNvPr id="9" name="Rectangle 8">
@@ -23917,6 +23972,7 @@
               </a:bodyPr>
               <a:lstStyle/>
               <a:p>
+                <a:pPr/>
                 <a14:m>
                   <m:oMathPara xmlns:m="http://schemas.openxmlformats.org/officeDocument/2006/math">
                     <m:oMathParaPr>
@@ -23940,7 +23996,7 @@
             </p:txBody>
           </p:sp>
         </mc:Choice>
-        <mc:Fallback>
+        <mc:Fallback xmlns="">
           <p:sp>
             <p:nvSpPr>
               <p:cNvPr id="9" name="Rectangle 8">
@@ -24615,8 +24671,8 @@
           </a:p>
         </p:txBody>
       </p:sp>
-      <mc:AlternateContent xmlns:mc="http://schemas.openxmlformats.org/markup-compatibility/2006">
-        <mc:Choice xmlns:a14="http://schemas.microsoft.com/office/drawing/2010/main" Requires="a14">
+      <mc:AlternateContent xmlns:mc="http://schemas.openxmlformats.org/markup-compatibility/2006" xmlns:a14="http://schemas.microsoft.com/office/drawing/2010/main">
+        <mc:Choice Requires="a14">
           <p:sp>
             <p:nvSpPr>
               <p:cNvPr id="8" name="Rectangle 7">
@@ -24644,6 +24700,7 @@
               </a:bodyPr>
               <a:lstStyle/>
               <a:p>
+                <a:pPr/>
                 <a14:m>
                   <m:oMathPara xmlns:m="http://schemas.openxmlformats.org/officeDocument/2006/math">
                     <m:oMathParaPr>
@@ -24667,7 +24724,7 @@
             </p:txBody>
           </p:sp>
         </mc:Choice>
-        <mc:Fallback>
+        <mc:Fallback xmlns="">
           <p:sp>
             <p:nvSpPr>
               <p:cNvPr id="8" name="Rectangle 7">
@@ -24712,8 +24769,8 @@
           </p:sp>
         </mc:Fallback>
       </mc:AlternateContent>
-      <mc:AlternateContent xmlns:mc="http://schemas.openxmlformats.org/markup-compatibility/2006">
-        <mc:Choice xmlns:a14="http://schemas.microsoft.com/office/drawing/2010/main" Requires="a14">
+      <mc:AlternateContent xmlns:mc="http://schemas.openxmlformats.org/markup-compatibility/2006" xmlns:a14="http://schemas.microsoft.com/office/drawing/2010/main">
+        <mc:Choice Requires="a14">
           <p:sp>
             <p:nvSpPr>
               <p:cNvPr id="9" name="Rectangle 8">
@@ -24741,6 +24798,7 @@
               </a:bodyPr>
               <a:lstStyle/>
               <a:p>
+                <a:pPr/>
                 <a14:m>
                   <m:oMathPara xmlns:m="http://schemas.openxmlformats.org/officeDocument/2006/math">
                     <m:oMathParaPr>
@@ -24764,7 +24822,7 @@
             </p:txBody>
           </p:sp>
         </mc:Choice>
-        <mc:Fallback>
+        <mc:Fallback xmlns="">
           <p:sp>
             <p:nvSpPr>
               <p:cNvPr id="9" name="Rectangle 8">
@@ -25683,8 +25741,8 @@
           </a:p>
         </p:txBody>
       </p:sp>
-      <mc:AlternateContent xmlns:mc="http://schemas.openxmlformats.org/markup-compatibility/2006">
-        <mc:Choice xmlns:a14="http://schemas.microsoft.com/office/drawing/2010/main" Requires="a14">
+      <mc:AlternateContent xmlns:mc="http://schemas.openxmlformats.org/markup-compatibility/2006" xmlns:a14="http://schemas.microsoft.com/office/drawing/2010/main">
+        <mc:Choice Requires="a14">
           <p:sp>
             <p:nvSpPr>
               <p:cNvPr id="10" name="Rectangle 9">
@@ -25712,6 +25770,7 @@
               </a:bodyPr>
               <a:lstStyle/>
               <a:p>
+                <a:pPr/>
                 <a14:m>
                   <m:oMathPara xmlns:m="http://schemas.openxmlformats.org/officeDocument/2006/math">
                     <m:oMathParaPr>
@@ -25863,7 +25922,7 @@
             </p:txBody>
           </p:sp>
         </mc:Choice>
-        <mc:Fallback>
+        <mc:Fallback xmlns="">
           <p:sp>
             <p:nvSpPr>
               <p:cNvPr id="10" name="Rectangle 9">
@@ -25908,8 +25967,8 @@
           </p:sp>
         </mc:Fallback>
       </mc:AlternateContent>
-      <mc:AlternateContent xmlns:mc="http://schemas.openxmlformats.org/markup-compatibility/2006">
-        <mc:Choice xmlns:a14="http://schemas.microsoft.com/office/drawing/2010/main" Requires="a14">
+      <mc:AlternateContent xmlns:mc="http://schemas.openxmlformats.org/markup-compatibility/2006" xmlns:a14="http://schemas.microsoft.com/office/drawing/2010/main">
+        <mc:Choice Requires="a14">
           <p:sp>
             <p:nvSpPr>
               <p:cNvPr id="11" name="Rectangle 10">
@@ -25937,6 +25996,7 @@
               </a:bodyPr>
               <a:lstStyle/>
               <a:p>
+                <a:pPr/>
                 <a14:m>
                   <m:oMathPara xmlns:m="http://schemas.openxmlformats.org/officeDocument/2006/math">
                     <m:oMathParaPr>
@@ -25960,7 +26020,7 @@
             </p:txBody>
           </p:sp>
         </mc:Choice>
-        <mc:Fallback>
+        <mc:Fallback xmlns="">
           <p:sp>
             <p:nvSpPr>
               <p:cNvPr id="11" name="Rectangle 10">
@@ -26005,8 +26065,8 @@
           </p:sp>
         </mc:Fallback>
       </mc:AlternateContent>
-      <mc:AlternateContent xmlns:mc="http://schemas.openxmlformats.org/markup-compatibility/2006">
-        <mc:Choice xmlns:a14="http://schemas.microsoft.com/office/drawing/2010/main" Requires="a14">
+      <mc:AlternateContent xmlns:mc="http://schemas.openxmlformats.org/markup-compatibility/2006" xmlns:a14="http://schemas.microsoft.com/office/drawing/2010/main">
+        <mc:Choice Requires="a14">
           <p:sp>
             <p:nvSpPr>
               <p:cNvPr id="12" name="Rectangle 11">
@@ -26034,6 +26094,7 @@
               </a:bodyPr>
               <a:lstStyle/>
               <a:p>
+                <a:pPr/>
                 <a14:m>
                   <m:oMathPara xmlns:m="http://schemas.openxmlformats.org/officeDocument/2006/math">
                     <m:oMathParaPr>
@@ -26057,7 +26118,7 @@
             </p:txBody>
           </p:sp>
         </mc:Choice>
-        <mc:Fallback>
+        <mc:Fallback xmlns="">
           <p:sp>
             <p:nvSpPr>
               <p:cNvPr id="12" name="Rectangle 11">
@@ -26290,8 +26351,8 @@
           </a:p>
         </p:txBody>
       </p:sp>
-      <mc:AlternateContent xmlns:mc="http://schemas.openxmlformats.org/markup-compatibility/2006">
-        <mc:Choice xmlns:a14="http://schemas.microsoft.com/office/drawing/2010/main" Requires="a14">
+      <mc:AlternateContent xmlns:mc="http://schemas.openxmlformats.org/markup-compatibility/2006" xmlns:a14="http://schemas.microsoft.com/office/drawing/2010/main">
+        <mc:Choice Requires="a14">
           <p:sp>
             <p:nvSpPr>
               <p:cNvPr id="21" name="Rectangle 20">
@@ -26319,6 +26380,7 @@
               </a:bodyPr>
               <a:lstStyle/>
               <a:p>
+                <a:pPr/>
                 <a14:m>
                   <m:oMathPara xmlns:m="http://schemas.openxmlformats.org/officeDocument/2006/math">
                     <m:oMathParaPr>
@@ -26343,7 +26405,7 @@
             </p:txBody>
           </p:sp>
         </mc:Choice>
-        <mc:Fallback>
+        <mc:Fallback xmlns="">
           <p:sp>
             <p:nvSpPr>
               <p:cNvPr id="21" name="Rectangle 20">
@@ -26388,8 +26450,8 @@
           </p:sp>
         </mc:Fallback>
       </mc:AlternateContent>
-      <mc:AlternateContent xmlns:mc="http://schemas.openxmlformats.org/markup-compatibility/2006">
-        <mc:Choice xmlns:a14="http://schemas.microsoft.com/office/drawing/2010/main" Requires="a14">
+      <mc:AlternateContent xmlns:mc="http://schemas.openxmlformats.org/markup-compatibility/2006" xmlns:a14="http://schemas.microsoft.com/office/drawing/2010/main">
+        <mc:Choice Requires="a14">
           <p:sp>
             <p:nvSpPr>
               <p:cNvPr id="22" name="Rectangle 21">
@@ -26417,6 +26479,7 @@
               </a:bodyPr>
               <a:lstStyle/>
               <a:p>
+                <a:pPr/>
                 <a14:m>
                   <m:oMathPara xmlns:m="http://schemas.openxmlformats.org/officeDocument/2006/math">
                     <m:oMathParaPr>
@@ -26437,7 +26500,7 @@
             </p:txBody>
           </p:sp>
         </mc:Choice>
-        <mc:Fallback>
+        <mc:Fallback xmlns="">
           <p:sp>
             <p:nvSpPr>
               <p:cNvPr id="22" name="Rectangle 21">
@@ -26482,8 +26545,8 @@
           </p:sp>
         </mc:Fallback>
       </mc:AlternateContent>
-      <mc:AlternateContent xmlns:mc="http://schemas.openxmlformats.org/markup-compatibility/2006">
-        <mc:Choice xmlns:a14="http://schemas.microsoft.com/office/drawing/2010/main" Requires="a14">
+      <mc:AlternateContent xmlns:mc="http://schemas.openxmlformats.org/markup-compatibility/2006" xmlns:a14="http://schemas.microsoft.com/office/drawing/2010/main">
+        <mc:Choice Requires="a14">
           <p:sp>
             <p:nvSpPr>
               <p:cNvPr id="15" name="Rectangle 14">
@@ -26511,6 +26574,7 @@
               </a:bodyPr>
               <a:lstStyle/>
               <a:p>
+                <a:pPr/>
                 <a14:m>
                   <m:oMathPara xmlns:m="http://schemas.openxmlformats.org/officeDocument/2006/math">
                     <m:oMathParaPr>
@@ -26648,7 +26712,7 @@
             </p:txBody>
           </p:sp>
         </mc:Choice>
-        <mc:Fallback>
+        <mc:Fallback xmlns="">
           <p:sp>
             <p:nvSpPr>
               <p:cNvPr id="15" name="Rectangle 14">
@@ -26998,8 +27062,8 @@
           </a:p>
         </p:txBody>
       </p:sp>
-      <mc:AlternateContent xmlns:mc="http://schemas.openxmlformats.org/markup-compatibility/2006">
-        <mc:Choice xmlns:a14="http://schemas.microsoft.com/office/drawing/2010/main" Requires="a14">
+      <mc:AlternateContent xmlns:mc="http://schemas.openxmlformats.org/markup-compatibility/2006" xmlns:a14="http://schemas.microsoft.com/office/drawing/2010/main">
+        <mc:Choice Requires="a14">
           <p:sp>
             <p:nvSpPr>
               <p:cNvPr id="10" name="Rectangle 9">
@@ -27027,6 +27091,7 @@
               </a:bodyPr>
               <a:lstStyle/>
               <a:p>
+                <a:pPr/>
                 <a14:m>
                   <m:oMathPara xmlns:m="http://schemas.openxmlformats.org/officeDocument/2006/math">
                     <m:oMathParaPr>
@@ -27178,7 +27243,7 @@
             </p:txBody>
           </p:sp>
         </mc:Choice>
-        <mc:Fallback>
+        <mc:Fallback xmlns="">
           <p:sp>
             <p:nvSpPr>
               <p:cNvPr id="10" name="Rectangle 9">
@@ -27223,8 +27288,8 @@
           </p:sp>
         </mc:Fallback>
       </mc:AlternateContent>
-      <mc:AlternateContent xmlns:mc="http://schemas.openxmlformats.org/markup-compatibility/2006">
-        <mc:Choice xmlns:a14="http://schemas.microsoft.com/office/drawing/2010/main" Requires="a14">
+      <mc:AlternateContent xmlns:mc="http://schemas.openxmlformats.org/markup-compatibility/2006" xmlns:a14="http://schemas.microsoft.com/office/drawing/2010/main">
+        <mc:Choice Requires="a14">
           <p:sp>
             <p:nvSpPr>
               <p:cNvPr id="11" name="Rectangle 10">
@@ -27252,6 +27317,7 @@
               </a:bodyPr>
               <a:lstStyle/>
               <a:p>
+                <a:pPr/>
                 <a14:m>
                   <m:oMathPara xmlns:m="http://schemas.openxmlformats.org/officeDocument/2006/math">
                     <m:oMathParaPr>
@@ -27275,7 +27341,7 @@
             </p:txBody>
           </p:sp>
         </mc:Choice>
-        <mc:Fallback>
+        <mc:Fallback xmlns="">
           <p:sp>
             <p:nvSpPr>
               <p:cNvPr id="11" name="Rectangle 10">
@@ -27320,8 +27386,8 @@
           </p:sp>
         </mc:Fallback>
       </mc:AlternateContent>
-      <mc:AlternateContent xmlns:mc="http://schemas.openxmlformats.org/markup-compatibility/2006">
-        <mc:Choice xmlns:a14="http://schemas.microsoft.com/office/drawing/2010/main" Requires="a14">
+      <mc:AlternateContent xmlns:mc="http://schemas.openxmlformats.org/markup-compatibility/2006" xmlns:a14="http://schemas.microsoft.com/office/drawing/2010/main">
+        <mc:Choice Requires="a14">
           <p:sp>
             <p:nvSpPr>
               <p:cNvPr id="12" name="Rectangle 11">
@@ -27349,6 +27415,7 @@
               </a:bodyPr>
               <a:lstStyle/>
               <a:p>
+                <a:pPr/>
                 <a14:m>
                   <m:oMathPara xmlns:m="http://schemas.openxmlformats.org/officeDocument/2006/math">
                     <m:oMathParaPr>
@@ -27372,7 +27439,7 @@
             </p:txBody>
           </p:sp>
         </mc:Choice>
-        <mc:Fallback>
+        <mc:Fallback xmlns="">
           <p:sp>
             <p:nvSpPr>
               <p:cNvPr id="12" name="Rectangle 11">
@@ -27693,8 +27760,8 @@
           </a:p>
         </p:txBody>
       </p:sp>
-      <mc:AlternateContent xmlns:mc="http://schemas.openxmlformats.org/markup-compatibility/2006">
-        <mc:Choice xmlns:a14="http://schemas.microsoft.com/office/drawing/2010/main" Requires="a14">
+      <mc:AlternateContent xmlns:mc="http://schemas.openxmlformats.org/markup-compatibility/2006" xmlns:a14="http://schemas.microsoft.com/office/drawing/2010/main">
+        <mc:Choice Requires="a14">
           <p:sp>
             <p:nvSpPr>
               <p:cNvPr id="17" name="Rectangle 16">
@@ -27722,6 +27789,7 @@
               </a:bodyPr>
               <a:lstStyle/>
               <a:p>
+                <a:pPr/>
                 <a14:m>
                   <m:oMathPara xmlns:m="http://schemas.openxmlformats.org/officeDocument/2006/math">
                     <m:oMathParaPr>
@@ -27746,7 +27814,7 @@
             </p:txBody>
           </p:sp>
         </mc:Choice>
-        <mc:Fallback>
+        <mc:Fallback xmlns="">
           <p:sp>
             <p:nvSpPr>
               <p:cNvPr id="17" name="Rectangle 16">
@@ -27791,8 +27859,8 @@
           </p:sp>
         </mc:Fallback>
       </mc:AlternateContent>
-      <mc:AlternateContent xmlns:mc="http://schemas.openxmlformats.org/markup-compatibility/2006">
-        <mc:Choice xmlns:a14="http://schemas.microsoft.com/office/drawing/2010/main" Requires="a14">
+      <mc:AlternateContent xmlns:mc="http://schemas.openxmlformats.org/markup-compatibility/2006" xmlns:a14="http://schemas.microsoft.com/office/drawing/2010/main">
+        <mc:Choice Requires="a14">
           <p:sp>
             <p:nvSpPr>
               <p:cNvPr id="19" name="Rectangle 18">
@@ -27820,6 +27888,7 @@
               </a:bodyPr>
               <a:lstStyle/>
               <a:p>
+                <a:pPr/>
                 <a14:m>
                   <m:oMathPara xmlns:m="http://schemas.openxmlformats.org/officeDocument/2006/math">
                     <m:oMathParaPr>
@@ -27927,7 +27996,7 @@
             </p:txBody>
           </p:sp>
         </mc:Choice>
-        <mc:Fallback>
+        <mc:Fallback xmlns="">
           <p:sp>
             <p:nvSpPr>
               <p:cNvPr id="19" name="Rectangle 18">
@@ -27972,8 +28041,8 @@
           </p:sp>
         </mc:Fallback>
       </mc:AlternateContent>
-      <mc:AlternateContent xmlns:mc="http://schemas.openxmlformats.org/markup-compatibility/2006">
-        <mc:Choice xmlns:a14="http://schemas.microsoft.com/office/drawing/2010/main" Requires="a14">
+      <mc:AlternateContent xmlns:mc="http://schemas.openxmlformats.org/markup-compatibility/2006" xmlns:a14="http://schemas.microsoft.com/office/drawing/2010/main">
+        <mc:Choice Requires="a14">
           <p:sp>
             <p:nvSpPr>
               <p:cNvPr id="20" name="Rectangle 19">
@@ -28001,6 +28070,7 @@
               </a:bodyPr>
               <a:lstStyle/>
               <a:p>
+                <a:pPr/>
                 <a14:m>
                   <m:oMathPara xmlns:m="http://schemas.openxmlformats.org/officeDocument/2006/math">
                     <m:oMathParaPr>
@@ -28108,7 +28178,7 @@
             </p:txBody>
           </p:sp>
         </mc:Choice>
-        <mc:Fallback>
+        <mc:Fallback xmlns="">
           <p:sp>
             <p:nvSpPr>
               <p:cNvPr id="20" name="Rectangle 19">
@@ -28153,8 +28223,8 @@
           </p:sp>
         </mc:Fallback>
       </mc:AlternateContent>
-      <mc:AlternateContent xmlns:mc="http://schemas.openxmlformats.org/markup-compatibility/2006">
-        <mc:Choice xmlns:a14="http://schemas.microsoft.com/office/drawing/2010/main" Requires="a14">
+      <mc:AlternateContent xmlns:mc="http://schemas.openxmlformats.org/markup-compatibility/2006" xmlns:a14="http://schemas.microsoft.com/office/drawing/2010/main">
+        <mc:Choice Requires="a14">
           <p:sp>
             <p:nvSpPr>
               <p:cNvPr id="21" name="Rectangle 20">
@@ -28182,6 +28252,7 @@
               </a:bodyPr>
               <a:lstStyle/>
               <a:p>
+                <a:pPr/>
                 <a14:m>
                   <m:oMathPara xmlns:m="http://schemas.openxmlformats.org/officeDocument/2006/math">
                     <m:oMathParaPr>
@@ -28202,7 +28273,7 @@
             </p:txBody>
           </p:sp>
         </mc:Choice>
-        <mc:Fallback>
+        <mc:Fallback xmlns="">
           <p:sp>
             <p:nvSpPr>
               <p:cNvPr id="21" name="Rectangle 20">
@@ -28436,8 +28507,8 @@
           </a:p>
         </p:txBody>
       </p:sp>
-      <mc:AlternateContent xmlns:mc="http://schemas.openxmlformats.org/markup-compatibility/2006">
-        <mc:Choice xmlns:a14="http://schemas.microsoft.com/office/drawing/2010/main" Requires="a14">
+      <mc:AlternateContent xmlns:mc="http://schemas.openxmlformats.org/markup-compatibility/2006" xmlns:a14="http://schemas.microsoft.com/office/drawing/2010/main">
+        <mc:Choice Requires="a14">
           <p:sp>
             <p:nvSpPr>
               <p:cNvPr id="10" name="Rectangle 9">
@@ -28465,6 +28536,7 @@
               </a:bodyPr>
               <a:lstStyle/>
               <a:p>
+                <a:pPr/>
                 <a14:m>
                   <m:oMathPara xmlns:m="http://schemas.openxmlformats.org/officeDocument/2006/math">
                     <m:oMathParaPr>
@@ -28616,7 +28688,7 @@
             </p:txBody>
           </p:sp>
         </mc:Choice>
-        <mc:Fallback>
+        <mc:Fallback xmlns="">
           <p:sp>
             <p:nvSpPr>
               <p:cNvPr id="10" name="Rectangle 9">
@@ -28661,8 +28733,8 @@
           </p:sp>
         </mc:Fallback>
       </mc:AlternateContent>
-      <mc:AlternateContent xmlns:mc="http://schemas.openxmlformats.org/markup-compatibility/2006">
-        <mc:Choice xmlns:a14="http://schemas.microsoft.com/office/drawing/2010/main" Requires="a14">
+      <mc:AlternateContent xmlns:mc="http://schemas.openxmlformats.org/markup-compatibility/2006" xmlns:a14="http://schemas.microsoft.com/office/drawing/2010/main">
+        <mc:Choice Requires="a14">
           <p:sp>
             <p:nvSpPr>
               <p:cNvPr id="11" name="Rectangle 10">
@@ -28690,6 +28762,7 @@
               </a:bodyPr>
               <a:lstStyle/>
               <a:p>
+                <a:pPr/>
                 <a14:m>
                   <m:oMathPara xmlns:m="http://schemas.openxmlformats.org/officeDocument/2006/math">
                     <m:oMathParaPr>
@@ -28713,7 +28786,7 @@
             </p:txBody>
           </p:sp>
         </mc:Choice>
-        <mc:Fallback>
+        <mc:Fallback xmlns="">
           <p:sp>
             <p:nvSpPr>
               <p:cNvPr id="11" name="Rectangle 10">
@@ -28758,8 +28831,8 @@
           </p:sp>
         </mc:Fallback>
       </mc:AlternateContent>
-      <mc:AlternateContent xmlns:mc="http://schemas.openxmlformats.org/markup-compatibility/2006">
-        <mc:Choice xmlns:a14="http://schemas.microsoft.com/office/drawing/2010/main" Requires="a14">
+      <mc:AlternateContent xmlns:mc="http://schemas.openxmlformats.org/markup-compatibility/2006" xmlns:a14="http://schemas.microsoft.com/office/drawing/2010/main">
+        <mc:Choice Requires="a14">
           <p:sp>
             <p:nvSpPr>
               <p:cNvPr id="12" name="Rectangle 11">
@@ -28787,6 +28860,7 @@
               </a:bodyPr>
               <a:lstStyle/>
               <a:p>
+                <a:pPr/>
                 <a14:m>
                   <m:oMathPara xmlns:m="http://schemas.openxmlformats.org/officeDocument/2006/math">
                     <m:oMathParaPr>
@@ -28810,7 +28884,7 @@
             </p:txBody>
           </p:sp>
         </mc:Choice>
-        <mc:Fallback>
+        <mc:Fallback xmlns="">
           <p:sp>
             <p:nvSpPr>
               <p:cNvPr id="12" name="Rectangle 11">
@@ -29033,8 +29107,8 @@
           </a:p>
         </p:txBody>
       </p:sp>
-      <mc:AlternateContent xmlns:mc="http://schemas.openxmlformats.org/markup-compatibility/2006">
-        <mc:Choice xmlns:a14="http://schemas.microsoft.com/office/drawing/2010/main" Requires="a14">
+      <mc:AlternateContent xmlns:mc="http://schemas.openxmlformats.org/markup-compatibility/2006" xmlns:a14="http://schemas.microsoft.com/office/drawing/2010/main">
+        <mc:Choice Requires="a14">
           <p:sp>
             <p:nvSpPr>
               <p:cNvPr id="17" name="Rectangle 16">
@@ -29062,6 +29136,7 @@
               </a:bodyPr>
               <a:lstStyle/>
               <a:p>
+                <a:pPr/>
                 <a14:m>
                   <m:oMathPara xmlns:m="http://schemas.openxmlformats.org/officeDocument/2006/math">
                     <m:oMathParaPr>
@@ -29086,7 +29161,7 @@
             </p:txBody>
           </p:sp>
         </mc:Choice>
-        <mc:Fallback>
+        <mc:Fallback xmlns="">
           <p:sp>
             <p:nvSpPr>
               <p:cNvPr id="17" name="Rectangle 16">
@@ -29131,8 +29206,8 @@
           </p:sp>
         </mc:Fallback>
       </mc:AlternateContent>
-      <mc:AlternateContent xmlns:mc="http://schemas.openxmlformats.org/markup-compatibility/2006">
-        <mc:Choice xmlns:a14="http://schemas.microsoft.com/office/drawing/2010/main" Requires="a14">
+      <mc:AlternateContent xmlns:mc="http://schemas.openxmlformats.org/markup-compatibility/2006" xmlns:a14="http://schemas.microsoft.com/office/drawing/2010/main">
+        <mc:Choice Requires="a14">
           <p:sp>
             <p:nvSpPr>
               <p:cNvPr id="19" name="Rectangle 18">
@@ -29160,6 +29235,7 @@
               </a:bodyPr>
               <a:lstStyle/>
               <a:p>
+                <a:pPr/>
                 <a14:m>
                   <m:oMathPara xmlns:m="http://schemas.openxmlformats.org/officeDocument/2006/math">
                     <m:oMathParaPr>
@@ -29217,7 +29293,7 @@
             </p:txBody>
           </p:sp>
         </mc:Choice>
-        <mc:Fallback>
+        <mc:Fallback xmlns="">
           <p:sp>
             <p:nvSpPr>
               <p:cNvPr id="19" name="Rectangle 18">
@@ -29262,8 +29338,8 @@
           </p:sp>
         </mc:Fallback>
       </mc:AlternateContent>
-      <mc:AlternateContent xmlns:mc="http://schemas.openxmlformats.org/markup-compatibility/2006">
-        <mc:Choice xmlns:a14="http://schemas.microsoft.com/office/drawing/2010/main" Requires="a14">
+      <mc:AlternateContent xmlns:mc="http://schemas.openxmlformats.org/markup-compatibility/2006" xmlns:a14="http://schemas.microsoft.com/office/drawing/2010/main">
+        <mc:Choice Requires="a14">
           <p:sp>
             <p:nvSpPr>
               <p:cNvPr id="20" name="Rectangle 19">
@@ -29291,6 +29367,7 @@
               </a:bodyPr>
               <a:lstStyle/>
               <a:p>
+                <a:pPr/>
                 <a14:m>
                   <m:oMathPara xmlns:m="http://schemas.openxmlformats.org/officeDocument/2006/math">
                     <m:oMathParaPr>
@@ -29348,7 +29425,7 @@
             </p:txBody>
           </p:sp>
         </mc:Choice>
-        <mc:Fallback>
+        <mc:Fallback xmlns="">
           <p:sp>
             <p:nvSpPr>
               <p:cNvPr id="20" name="Rectangle 19">
@@ -29393,8 +29470,8 @@
           </p:sp>
         </mc:Fallback>
       </mc:AlternateContent>
-      <mc:AlternateContent xmlns:mc="http://schemas.openxmlformats.org/markup-compatibility/2006">
-        <mc:Choice xmlns:a14="http://schemas.microsoft.com/office/drawing/2010/main" Requires="a14">
+      <mc:AlternateContent xmlns:mc="http://schemas.openxmlformats.org/markup-compatibility/2006" xmlns:a14="http://schemas.microsoft.com/office/drawing/2010/main">
+        <mc:Choice Requires="a14">
           <p:sp>
             <p:nvSpPr>
               <p:cNvPr id="21" name="Rectangle 20">
@@ -29422,6 +29499,7 @@
               </a:bodyPr>
               <a:lstStyle/>
               <a:p>
+                <a:pPr/>
                 <a14:m>
                   <m:oMathPara xmlns:m="http://schemas.openxmlformats.org/officeDocument/2006/math">
                     <m:oMathParaPr>
@@ -29442,7 +29520,7 @@
             </p:txBody>
           </p:sp>
         </mc:Choice>
-        <mc:Fallback>
+        <mc:Fallback xmlns="">
           <p:sp>
             <p:nvSpPr>
               <p:cNvPr id="21" name="Rectangle 20">
@@ -29971,8 +30049,8 @@
           </a:p>
         </p:txBody>
       </p:sp>
-      <mc:AlternateContent xmlns:mc="http://schemas.openxmlformats.org/markup-compatibility/2006">
-        <mc:Choice xmlns:a14="http://schemas.microsoft.com/office/drawing/2010/main" Requires="a14">
+      <mc:AlternateContent xmlns:mc="http://schemas.openxmlformats.org/markup-compatibility/2006" xmlns:a14="http://schemas.microsoft.com/office/drawing/2010/main">
+        <mc:Choice Requires="a14">
           <p:sp>
             <p:nvSpPr>
               <p:cNvPr id="10" name="Rectangle 9">
@@ -30000,6 +30078,7 @@
               </a:bodyPr>
               <a:lstStyle/>
               <a:p>
+                <a:pPr/>
                 <a14:m>
                   <m:oMathPara xmlns:m="http://schemas.openxmlformats.org/officeDocument/2006/math">
                     <m:oMathParaPr>
@@ -30151,7 +30230,7 @@
             </p:txBody>
           </p:sp>
         </mc:Choice>
-        <mc:Fallback>
+        <mc:Fallback xmlns="">
           <p:sp>
             <p:nvSpPr>
               <p:cNvPr id="10" name="Rectangle 9">
@@ -30196,8 +30275,8 @@
           </p:sp>
         </mc:Fallback>
       </mc:AlternateContent>
-      <mc:AlternateContent xmlns:mc="http://schemas.openxmlformats.org/markup-compatibility/2006">
-        <mc:Choice xmlns:a14="http://schemas.microsoft.com/office/drawing/2010/main" Requires="a14">
+      <mc:AlternateContent xmlns:mc="http://schemas.openxmlformats.org/markup-compatibility/2006" xmlns:a14="http://schemas.microsoft.com/office/drawing/2010/main">
+        <mc:Choice Requires="a14">
           <p:sp>
             <p:nvSpPr>
               <p:cNvPr id="11" name="Rectangle 10">
@@ -30225,6 +30304,7 @@
               </a:bodyPr>
               <a:lstStyle/>
               <a:p>
+                <a:pPr/>
                 <a14:m>
                   <m:oMathPara xmlns:m="http://schemas.openxmlformats.org/officeDocument/2006/math">
                     <m:oMathParaPr>
@@ -30248,7 +30328,7 @@
             </p:txBody>
           </p:sp>
         </mc:Choice>
-        <mc:Fallback>
+        <mc:Fallback xmlns="">
           <p:sp>
             <p:nvSpPr>
               <p:cNvPr id="11" name="Rectangle 10">
@@ -30293,8 +30373,8 @@
           </p:sp>
         </mc:Fallback>
       </mc:AlternateContent>
-      <mc:AlternateContent xmlns:mc="http://schemas.openxmlformats.org/markup-compatibility/2006">
-        <mc:Choice xmlns:a14="http://schemas.microsoft.com/office/drawing/2010/main" Requires="a14">
+      <mc:AlternateContent xmlns:mc="http://schemas.openxmlformats.org/markup-compatibility/2006" xmlns:a14="http://schemas.microsoft.com/office/drawing/2010/main">
+        <mc:Choice Requires="a14">
           <p:sp>
             <p:nvSpPr>
               <p:cNvPr id="12" name="Rectangle 11">
@@ -30322,6 +30402,7 @@
               </a:bodyPr>
               <a:lstStyle/>
               <a:p>
+                <a:pPr/>
                 <a14:m>
                   <m:oMathPara xmlns:m="http://schemas.openxmlformats.org/officeDocument/2006/math">
                     <m:oMathParaPr>
@@ -30345,7 +30426,7 @@
             </p:txBody>
           </p:sp>
         </mc:Choice>
-        <mc:Fallback>
+        <mc:Fallback xmlns="">
           <p:sp>
             <p:nvSpPr>
               <p:cNvPr id="12" name="Rectangle 11">
@@ -30568,8 +30649,8 @@
           </a:p>
         </p:txBody>
       </p:sp>
-      <mc:AlternateContent xmlns:mc="http://schemas.openxmlformats.org/markup-compatibility/2006">
-        <mc:Choice xmlns:a14="http://schemas.microsoft.com/office/drawing/2010/main" Requires="a14">
+      <mc:AlternateContent xmlns:mc="http://schemas.openxmlformats.org/markup-compatibility/2006" xmlns:a14="http://schemas.microsoft.com/office/drawing/2010/main">
+        <mc:Choice Requires="a14">
           <p:sp>
             <p:nvSpPr>
               <p:cNvPr id="17" name="Rectangle 16">
@@ -30597,6 +30678,7 @@
               </a:bodyPr>
               <a:lstStyle/>
               <a:p>
+                <a:pPr/>
                 <a14:m>
                   <m:oMathPara xmlns:m="http://schemas.openxmlformats.org/officeDocument/2006/math">
                     <m:oMathParaPr>
@@ -30621,7 +30703,7 @@
             </p:txBody>
           </p:sp>
         </mc:Choice>
-        <mc:Fallback>
+        <mc:Fallback xmlns="">
           <p:sp>
             <p:nvSpPr>
               <p:cNvPr id="17" name="Rectangle 16">
@@ -30666,8 +30748,8 @@
           </p:sp>
         </mc:Fallback>
       </mc:AlternateContent>
-      <mc:AlternateContent xmlns:mc="http://schemas.openxmlformats.org/markup-compatibility/2006">
-        <mc:Choice xmlns:a14="http://schemas.microsoft.com/office/drawing/2010/main" Requires="a14">
+      <mc:AlternateContent xmlns:mc="http://schemas.openxmlformats.org/markup-compatibility/2006" xmlns:a14="http://schemas.microsoft.com/office/drawing/2010/main">
+        <mc:Choice Requires="a14">
           <p:sp>
             <p:nvSpPr>
               <p:cNvPr id="19" name="Rectangle 18">
@@ -30695,6 +30777,7 @@
               </a:bodyPr>
               <a:lstStyle/>
               <a:p>
+                <a:pPr/>
                 <a14:m>
                   <m:oMathPara xmlns:m="http://schemas.openxmlformats.org/officeDocument/2006/math">
                     <m:oMathParaPr>
@@ -30752,7 +30835,7 @@
             </p:txBody>
           </p:sp>
         </mc:Choice>
-        <mc:Fallback>
+        <mc:Fallback xmlns="">
           <p:sp>
             <p:nvSpPr>
               <p:cNvPr id="19" name="Rectangle 18">
@@ -30797,8 +30880,8 @@
           </p:sp>
         </mc:Fallback>
       </mc:AlternateContent>
-      <mc:AlternateContent xmlns:mc="http://schemas.openxmlformats.org/markup-compatibility/2006">
-        <mc:Choice xmlns:a14="http://schemas.microsoft.com/office/drawing/2010/main" Requires="a14">
+      <mc:AlternateContent xmlns:mc="http://schemas.openxmlformats.org/markup-compatibility/2006" xmlns:a14="http://schemas.microsoft.com/office/drawing/2010/main">
+        <mc:Choice Requires="a14">
           <p:sp>
             <p:nvSpPr>
               <p:cNvPr id="20" name="Rectangle 19">
@@ -30826,6 +30909,7 @@
               </a:bodyPr>
               <a:lstStyle/>
               <a:p>
+                <a:pPr/>
                 <a14:m>
                   <m:oMathPara xmlns:m="http://schemas.openxmlformats.org/officeDocument/2006/math">
                     <m:oMathParaPr>
@@ -30883,7 +30967,7 @@
             </p:txBody>
           </p:sp>
         </mc:Choice>
-        <mc:Fallback>
+        <mc:Fallback xmlns="">
           <p:sp>
             <p:nvSpPr>
               <p:cNvPr id="20" name="Rectangle 19">
@@ -30928,8 +31012,8 @@
           </p:sp>
         </mc:Fallback>
       </mc:AlternateContent>
-      <mc:AlternateContent xmlns:mc="http://schemas.openxmlformats.org/markup-compatibility/2006">
-        <mc:Choice xmlns:a14="http://schemas.microsoft.com/office/drawing/2010/main" Requires="a14">
+      <mc:AlternateContent xmlns:mc="http://schemas.openxmlformats.org/markup-compatibility/2006" xmlns:a14="http://schemas.microsoft.com/office/drawing/2010/main">
+        <mc:Choice Requires="a14">
           <p:sp>
             <p:nvSpPr>
               <p:cNvPr id="21" name="Rectangle 20">
@@ -30957,6 +31041,7 @@
               </a:bodyPr>
               <a:lstStyle/>
               <a:p>
+                <a:pPr/>
                 <a14:m>
                   <m:oMathPara xmlns:m="http://schemas.openxmlformats.org/officeDocument/2006/math">
                     <m:oMathParaPr>
@@ -30977,7 +31062,7 @@
             </p:txBody>
           </p:sp>
         </mc:Choice>
-        <mc:Fallback>
+        <mc:Fallback xmlns="">
           <p:sp>
             <p:nvSpPr>
               <p:cNvPr id="21" name="Rectangle 20">
@@ -31626,8 +31711,8 @@
           </a:p>
         </p:txBody>
       </p:sp>
-      <mc:AlternateContent xmlns:mc="http://schemas.openxmlformats.org/markup-compatibility/2006">
-        <mc:Choice xmlns:a14="http://schemas.microsoft.com/office/drawing/2010/main" Requires="a14">
+      <mc:AlternateContent xmlns:mc="http://schemas.openxmlformats.org/markup-compatibility/2006" xmlns:a14="http://schemas.microsoft.com/office/drawing/2010/main">
+        <mc:Choice Requires="a14">
           <p:sp>
             <p:nvSpPr>
               <p:cNvPr id="10" name="Rectangle 9">
@@ -31655,6 +31740,7 @@
               </a:bodyPr>
               <a:lstStyle/>
               <a:p>
+                <a:pPr/>
                 <a14:m>
                   <m:oMathPara xmlns:m="http://schemas.openxmlformats.org/officeDocument/2006/math">
                     <m:oMathParaPr>
@@ -31806,7 +31892,7 @@
             </p:txBody>
           </p:sp>
         </mc:Choice>
-        <mc:Fallback>
+        <mc:Fallback xmlns="">
           <p:sp>
             <p:nvSpPr>
               <p:cNvPr id="10" name="Rectangle 9">
@@ -31851,8 +31937,8 @@
           </p:sp>
         </mc:Fallback>
       </mc:AlternateContent>
-      <mc:AlternateContent xmlns:mc="http://schemas.openxmlformats.org/markup-compatibility/2006">
-        <mc:Choice xmlns:a14="http://schemas.microsoft.com/office/drawing/2010/main" Requires="a14">
+      <mc:AlternateContent xmlns:mc="http://schemas.openxmlformats.org/markup-compatibility/2006" xmlns:a14="http://schemas.microsoft.com/office/drawing/2010/main">
+        <mc:Choice Requires="a14">
           <p:sp>
             <p:nvSpPr>
               <p:cNvPr id="11" name="Rectangle 10">
@@ -31880,6 +31966,7 @@
               </a:bodyPr>
               <a:lstStyle/>
               <a:p>
+                <a:pPr/>
                 <a14:m>
                   <m:oMathPara xmlns:m="http://schemas.openxmlformats.org/officeDocument/2006/math">
                     <m:oMathParaPr>
@@ -31903,7 +31990,7 @@
             </p:txBody>
           </p:sp>
         </mc:Choice>
-        <mc:Fallback>
+        <mc:Fallback xmlns="">
           <p:sp>
             <p:nvSpPr>
               <p:cNvPr id="11" name="Rectangle 10">
@@ -31948,8 +32035,8 @@
           </p:sp>
         </mc:Fallback>
       </mc:AlternateContent>
-      <mc:AlternateContent xmlns:mc="http://schemas.openxmlformats.org/markup-compatibility/2006">
-        <mc:Choice xmlns:a14="http://schemas.microsoft.com/office/drawing/2010/main" Requires="a14">
+      <mc:AlternateContent xmlns:mc="http://schemas.openxmlformats.org/markup-compatibility/2006" xmlns:a14="http://schemas.microsoft.com/office/drawing/2010/main">
+        <mc:Choice Requires="a14">
           <p:sp>
             <p:nvSpPr>
               <p:cNvPr id="12" name="Rectangle 11">
@@ -31977,6 +32064,7 @@
               </a:bodyPr>
               <a:lstStyle/>
               <a:p>
+                <a:pPr/>
                 <a14:m>
                   <m:oMathPara xmlns:m="http://schemas.openxmlformats.org/officeDocument/2006/math">
                     <m:oMathParaPr>
@@ -32000,7 +32088,7 @@
             </p:txBody>
           </p:sp>
         </mc:Choice>
-        <mc:Fallback>
+        <mc:Fallback xmlns="">
           <p:sp>
             <p:nvSpPr>
               <p:cNvPr id="12" name="Rectangle 11">
@@ -32223,8 +32311,8 @@
           </a:p>
         </p:txBody>
       </p:sp>
-      <mc:AlternateContent xmlns:mc="http://schemas.openxmlformats.org/markup-compatibility/2006">
-        <mc:Choice xmlns:a14="http://schemas.microsoft.com/office/drawing/2010/main" Requires="a14">
+      <mc:AlternateContent xmlns:mc="http://schemas.openxmlformats.org/markup-compatibility/2006" xmlns:a14="http://schemas.microsoft.com/office/drawing/2010/main">
+        <mc:Choice Requires="a14">
           <p:sp>
             <p:nvSpPr>
               <p:cNvPr id="17" name="Rectangle 16">
@@ -32252,6 +32340,7 @@
               </a:bodyPr>
               <a:lstStyle/>
               <a:p>
+                <a:pPr/>
                 <a14:m>
                   <m:oMathPara xmlns:m="http://schemas.openxmlformats.org/officeDocument/2006/math">
                     <m:oMathParaPr>
@@ -32276,7 +32365,7 @@
             </p:txBody>
           </p:sp>
         </mc:Choice>
-        <mc:Fallback>
+        <mc:Fallback xmlns="">
           <p:sp>
             <p:nvSpPr>
               <p:cNvPr id="17" name="Rectangle 16">
@@ -32321,8 +32410,8 @@
           </p:sp>
         </mc:Fallback>
       </mc:AlternateContent>
-      <mc:AlternateContent xmlns:mc="http://schemas.openxmlformats.org/markup-compatibility/2006">
-        <mc:Choice xmlns:a14="http://schemas.microsoft.com/office/drawing/2010/main" Requires="a14">
+      <mc:AlternateContent xmlns:mc="http://schemas.openxmlformats.org/markup-compatibility/2006" xmlns:a14="http://schemas.microsoft.com/office/drawing/2010/main">
+        <mc:Choice Requires="a14">
           <p:sp>
             <p:nvSpPr>
               <p:cNvPr id="19" name="Rectangle 18">
@@ -32350,6 +32439,7 @@
               </a:bodyPr>
               <a:lstStyle/>
               <a:p>
+                <a:pPr/>
                 <a14:m>
                   <m:oMathPara xmlns:m="http://schemas.openxmlformats.org/officeDocument/2006/math">
                     <m:oMathParaPr>
@@ -32407,7 +32497,7 @@
             </p:txBody>
           </p:sp>
         </mc:Choice>
-        <mc:Fallback>
+        <mc:Fallback xmlns="">
           <p:sp>
             <p:nvSpPr>
               <p:cNvPr id="19" name="Rectangle 18">
@@ -32452,8 +32542,8 @@
           </p:sp>
         </mc:Fallback>
       </mc:AlternateContent>
-      <mc:AlternateContent xmlns:mc="http://schemas.openxmlformats.org/markup-compatibility/2006">
-        <mc:Choice xmlns:a14="http://schemas.microsoft.com/office/drawing/2010/main" Requires="a14">
+      <mc:AlternateContent xmlns:mc="http://schemas.openxmlformats.org/markup-compatibility/2006" xmlns:a14="http://schemas.microsoft.com/office/drawing/2010/main">
+        <mc:Choice Requires="a14">
           <p:sp>
             <p:nvSpPr>
               <p:cNvPr id="20" name="Rectangle 19">
@@ -32481,6 +32571,7 @@
               </a:bodyPr>
               <a:lstStyle/>
               <a:p>
+                <a:pPr/>
                 <a14:m>
                   <m:oMathPara xmlns:m="http://schemas.openxmlformats.org/officeDocument/2006/math">
                     <m:oMathParaPr>
@@ -32538,7 +32629,7 @@
             </p:txBody>
           </p:sp>
         </mc:Choice>
-        <mc:Fallback>
+        <mc:Fallback xmlns="">
           <p:sp>
             <p:nvSpPr>
               <p:cNvPr id="20" name="Rectangle 19">
@@ -32583,8 +32674,8 @@
           </p:sp>
         </mc:Fallback>
       </mc:AlternateContent>
-      <mc:AlternateContent xmlns:mc="http://schemas.openxmlformats.org/markup-compatibility/2006">
-        <mc:Choice xmlns:a14="http://schemas.microsoft.com/office/drawing/2010/main" Requires="a14">
+      <mc:AlternateContent xmlns:mc="http://schemas.openxmlformats.org/markup-compatibility/2006" xmlns:a14="http://schemas.microsoft.com/office/drawing/2010/main">
+        <mc:Choice Requires="a14">
           <p:sp>
             <p:nvSpPr>
               <p:cNvPr id="21" name="Rectangle 20">
@@ -32612,6 +32703,7 @@
               </a:bodyPr>
               <a:lstStyle/>
               <a:p>
+                <a:pPr/>
                 <a14:m>
                   <m:oMathPara xmlns:m="http://schemas.openxmlformats.org/officeDocument/2006/math">
                     <m:oMathParaPr>
@@ -32632,7 +32724,7 @@
             </p:txBody>
           </p:sp>
         </mc:Choice>
-        <mc:Fallback>
+        <mc:Fallback xmlns="">
           <p:sp>
             <p:nvSpPr>
               <p:cNvPr id="21" name="Rectangle 20">
@@ -33379,8 +33471,8 @@
           </a:p>
         </p:txBody>
       </p:sp>
-      <mc:AlternateContent xmlns:mc="http://schemas.openxmlformats.org/markup-compatibility/2006">
-        <mc:Choice xmlns:a14="http://schemas.microsoft.com/office/drawing/2010/main" Requires="a14">
+      <mc:AlternateContent xmlns:mc="http://schemas.openxmlformats.org/markup-compatibility/2006" xmlns:a14="http://schemas.microsoft.com/office/drawing/2010/main">
+        <mc:Choice Requires="a14">
           <p:sp>
             <p:nvSpPr>
               <p:cNvPr id="44" name="Rectangle 43">
@@ -33408,6 +33500,7 @@
               </a:bodyPr>
               <a:lstStyle/>
               <a:p>
+                <a:pPr/>
                 <a14:m>
                   <m:oMathPara xmlns:m="http://schemas.openxmlformats.org/officeDocument/2006/math">
                     <m:oMathParaPr>
@@ -33459,7 +33552,7 @@
             </p:txBody>
           </p:sp>
         </mc:Choice>
-        <mc:Fallback>
+        <mc:Fallback xmlns="">
           <p:sp>
             <p:nvSpPr>
               <p:cNvPr id="44" name="Rectangle 43">
@@ -33504,8 +33597,8 @@
           </p:sp>
         </mc:Fallback>
       </mc:AlternateContent>
-      <mc:AlternateContent xmlns:mc="http://schemas.openxmlformats.org/markup-compatibility/2006">
-        <mc:Choice xmlns:a14="http://schemas.microsoft.com/office/drawing/2010/main" Requires="a14">
+      <mc:AlternateContent xmlns:mc="http://schemas.openxmlformats.org/markup-compatibility/2006" xmlns:a14="http://schemas.microsoft.com/office/drawing/2010/main">
+        <mc:Choice Requires="a14">
           <p:sp>
             <p:nvSpPr>
               <p:cNvPr id="45" name="Rectangle 44">
@@ -33533,6 +33626,7 @@
               </a:bodyPr>
               <a:lstStyle/>
               <a:p>
+                <a:pPr/>
                 <a14:m>
                   <m:oMathPara xmlns:m="http://schemas.openxmlformats.org/officeDocument/2006/math">
                     <m:oMathParaPr>
@@ -33581,7 +33675,7 @@
             </p:txBody>
           </p:sp>
         </mc:Choice>
-        <mc:Fallback>
+        <mc:Fallback xmlns="">
           <p:sp>
             <p:nvSpPr>
               <p:cNvPr id="45" name="Rectangle 44">
@@ -33815,8 +33909,8 @@
           </a:p>
         </p:txBody>
       </p:sp>
-      <mc:AlternateContent xmlns:mc="http://schemas.openxmlformats.org/markup-compatibility/2006">
-        <mc:Choice xmlns:a14="http://schemas.microsoft.com/office/drawing/2010/main" Requires="a14">
+      <mc:AlternateContent xmlns:mc="http://schemas.openxmlformats.org/markup-compatibility/2006" xmlns:a14="http://schemas.microsoft.com/office/drawing/2010/main">
+        <mc:Choice Requires="a14">
           <p:sp>
             <p:nvSpPr>
               <p:cNvPr id="10" name="Rectangle 9">
@@ -33844,6 +33938,7 @@
               </a:bodyPr>
               <a:lstStyle/>
               <a:p>
+                <a:pPr/>
                 <a14:m>
                   <m:oMathPara xmlns:m="http://schemas.openxmlformats.org/officeDocument/2006/math">
                     <m:oMathParaPr>
@@ -33995,7 +34090,7 @@
             </p:txBody>
           </p:sp>
         </mc:Choice>
-        <mc:Fallback>
+        <mc:Fallback xmlns="">
           <p:sp>
             <p:nvSpPr>
               <p:cNvPr id="10" name="Rectangle 9">
@@ -34040,8 +34135,8 @@
           </p:sp>
         </mc:Fallback>
       </mc:AlternateContent>
-      <mc:AlternateContent xmlns:mc="http://schemas.openxmlformats.org/markup-compatibility/2006">
-        <mc:Choice xmlns:a14="http://schemas.microsoft.com/office/drawing/2010/main" Requires="a14">
+      <mc:AlternateContent xmlns:mc="http://schemas.openxmlformats.org/markup-compatibility/2006" xmlns:a14="http://schemas.microsoft.com/office/drawing/2010/main">
+        <mc:Choice Requires="a14">
           <p:sp>
             <p:nvSpPr>
               <p:cNvPr id="11" name="Rectangle 10">
@@ -34069,6 +34164,7 @@
               </a:bodyPr>
               <a:lstStyle/>
               <a:p>
+                <a:pPr/>
                 <a14:m>
                   <m:oMathPara xmlns:m="http://schemas.openxmlformats.org/officeDocument/2006/math">
                     <m:oMathParaPr>
@@ -34092,7 +34188,7 @@
             </p:txBody>
           </p:sp>
         </mc:Choice>
-        <mc:Fallback>
+        <mc:Fallback xmlns="">
           <p:sp>
             <p:nvSpPr>
               <p:cNvPr id="11" name="Rectangle 10">
@@ -34137,8 +34233,8 @@
           </p:sp>
         </mc:Fallback>
       </mc:AlternateContent>
-      <mc:AlternateContent xmlns:mc="http://schemas.openxmlformats.org/markup-compatibility/2006">
-        <mc:Choice xmlns:a14="http://schemas.microsoft.com/office/drawing/2010/main" Requires="a14">
+      <mc:AlternateContent xmlns:mc="http://schemas.openxmlformats.org/markup-compatibility/2006" xmlns:a14="http://schemas.microsoft.com/office/drawing/2010/main">
+        <mc:Choice Requires="a14">
           <p:sp>
             <p:nvSpPr>
               <p:cNvPr id="12" name="Rectangle 11">
@@ -34166,6 +34262,7 @@
               </a:bodyPr>
               <a:lstStyle/>
               <a:p>
+                <a:pPr/>
                 <a14:m>
                   <m:oMathPara xmlns:m="http://schemas.openxmlformats.org/officeDocument/2006/math">
                     <m:oMathParaPr>
@@ -34189,7 +34286,7 @@
             </p:txBody>
           </p:sp>
         </mc:Choice>
-        <mc:Fallback>
+        <mc:Fallback xmlns="">
           <p:sp>
             <p:nvSpPr>
               <p:cNvPr id="12" name="Rectangle 11">
@@ -34412,8 +34509,8 @@
           </a:p>
         </p:txBody>
       </p:sp>
-      <mc:AlternateContent xmlns:mc="http://schemas.openxmlformats.org/markup-compatibility/2006">
-        <mc:Choice xmlns:a14="http://schemas.microsoft.com/office/drawing/2010/main" Requires="a14">
+      <mc:AlternateContent xmlns:mc="http://schemas.openxmlformats.org/markup-compatibility/2006" xmlns:a14="http://schemas.microsoft.com/office/drawing/2010/main">
+        <mc:Choice Requires="a14">
           <p:sp>
             <p:nvSpPr>
               <p:cNvPr id="17" name="Rectangle 16">
@@ -34441,6 +34538,7 @@
               </a:bodyPr>
               <a:lstStyle/>
               <a:p>
+                <a:pPr/>
                 <a14:m>
                   <m:oMathPara xmlns:m="http://schemas.openxmlformats.org/officeDocument/2006/math">
                     <m:oMathParaPr>
@@ -34465,7 +34563,7 @@
             </p:txBody>
           </p:sp>
         </mc:Choice>
-        <mc:Fallback>
+        <mc:Fallback xmlns="">
           <p:sp>
             <p:nvSpPr>
               <p:cNvPr id="17" name="Rectangle 16">
@@ -34510,8 +34608,8 @@
           </p:sp>
         </mc:Fallback>
       </mc:AlternateContent>
-      <mc:AlternateContent xmlns:mc="http://schemas.openxmlformats.org/markup-compatibility/2006">
-        <mc:Choice xmlns:a14="http://schemas.microsoft.com/office/drawing/2010/main" Requires="a14">
+      <mc:AlternateContent xmlns:mc="http://schemas.openxmlformats.org/markup-compatibility/2006" xmlns:a14="http://schemas.microsoft.com/office/drawing/2010/main">
+        <mc:Choice Requires="a14">
           <p:sp>
             <p:nvSpPr>
               <p:cNvPr id="19" name="Rectangle 18">
@@ -34539,6 +34637,7 @@
               </a:bodyPr>
               <a:lstStyle/>
               <a:p>
+                <a:pPr/>
                 <a14:m>
                   <m:oMathPara xmlns:m="http://schemas.openxmlformats.org/officeDocument/2006/math">
                     <m:oMathParaPr>
@@ -34728,7 +34827,7 @@
             </p:txBody>
           </p:sp>
         </mc:Choice>
-        <mc:Fallback>
+        <mc:Fallback xmlns="">
           <p:sp>
             <p:nvSpPr>
               <p:cNvPr id="19" name="Rectangle 18">
@@ -34773,8 +34872,8 @@
           </p:sp>
         </mc:Fallback>
       </mc:AlternateContent>
-      <mc:AlternateContent xmlns:mc="http://schemas.openxmlformats.org/markup-compatibility/2006">
-        <mc:Choice xmlns:a14="http://schemas.microsoft.com/office/drawing/2010/main" Requires="a14">
+      <mc:AlternateContent xmlns:mc="http://schemas.openxmlformats.org/markup-compatibility/2006" xmlns:a14="http://schemas.microsoft.com/office/drawing/2010/main">
+        <mc:Choice Requires="a14">
           <p:sp>
             <p:nvSpPr>
               <p:cNvPr id="20" name="Rectangle 19">
@@ -34802,6 +34901,7 @@
               </a:bodyPr>
               <a:lstStyle/>
               <a:p>
+                <a:pPr/>
                 <a14:m>
                   <m:oMathPara xmlns:m="http://schemas.openxmlformats.org/officeDocument/2006/math">
                     <m:oMathParaPr>
@@ -34987,7 +35087,7 @@
             </p:txBody>
           </p:sp>
         </mc:Choice>
-        <mc:Fallback>
+        <mc:Fallback xmlns="">
           <p:sp>
             <p:nvSpPr>
               <p:cNvPr id="20" name="Rectangle 19">
@@ -35327,8 +35427,8 @@
           </a:p>
         </p:txBody>
       </p:sp>
-      <mc:AlternateContent xmlns:mc="http://schemas.openxmlformats.org/markup-compatibility/2006">
-        <mc:Choice xmlns:a14="http://schemas.microsoft.com/office/drawing/2010/main" Requires="a14">
+      <mc:AlternateContent xmlns:mc="http://schemas.openxmlformats.org/markup-compatibility/2006" xmlns:a14="http://schemas.microsoft.com/office/drawing/2010/main">
+        <mc:Choice Requires="a14">
           <p:sp>
             <p:nvSpPr>
               <p:cNvPr id="35" name="Rectangle 34">
@@ -35356,6 +35456,7 @@
               </a:bodyPr>
               <a:lstStyle/>
               <a:p>
+                <a:pPr/>
                 <a14:m>
                   <m:oMathPara xmlns:m="http://schemas.openxmlformats.org/officeDocument/2006/math">
                     <m:oMathParaPr>
@@ -35484,7 +35585,7 @@
             </p:txBody>
           </p:sp>
         </mc:Choice>
-        <mc:Fallback>
+        <mc:Fallback xmlns="">
           <p:sp>
             <p:nvSpPr>
               <p:cNvPr id="35" name="Rectangle 34">

</xml_diff>